<commit_message>
Add things on presentation
</commit_message>
<xml_diff>
--- a/interoperability/Development of a catalog of federated SPARQL queries in the field of Rare Diseases/BH_Orphanet_SPARQL.pptx
+++ b/interoperability/Development of a catalog of federated SPARQL queries in the field of Rare Diseases/BH_Orphanet_SPARQL.pptx
@@ -5,17 +5,18 @@
     <p:sldMasterId id="2147483648" r:id="rId1"/>
   </p:sldMasterIdLst>
   <p:notesMasterIdLst>
-    <p:notesMasterId r:id="rId10"/>
+    <p:notesMasterId r:id="rId11"/>
   </p:notesMasterIdLst>
   <p:sldIdLst>
     <p:sldId id="262" r:id="rId2"/>
-    <p:sldId id="273" r:id="rId3"/>
-    <p:sldId id="269" r:id="rId4"/>
-    <p:sldId id="279" r:id="rId5"/>
-    <p:sldId id="270" r:id="rId6"/>
-    <p:sldId id="278" r:id="rId7"/>
-    <p:sldId id="260" r:id="rId8"/>
-    <p:sldId id="275" r:id="rId9"/>
+    <p:sldId id="280" r:id="rId3"/>
+    <p:sldId id="273" r:id="rId4"/>
+    <p:sldId id="269" r:id="rId5"/>
+    <p:sldId id="279" r:id="rId6"/>
+    <p:sldId id="270" r:id="rId7"/>
+    <p:sldId id="278" r:id="rId8"/>
+    <p:sldId id="260" r:id="rId9"/>
+    <p:sldId id="275" r:id="rId10"/>
   </p:sldIdLst>
   <p:sldSz cx="12192000" cy="6858000"/>
   <p:notesSz cx="6858000" cy="9144000"/>
@@ -204,7 +205,7 @@
           <a:p>
             <a:fld id="{D304DAE6-7A8F-4F48-9AD1-F278C4226D9A}" type="datetimeFigureOut">
               <a:rPr lang="fr-FR" smtClean="0"/>
-              <a:t>09/11/2018</a:t>
+              <a:t>11/11/2018</a:t>
             </a:fld>
             <a:endParaRPr lang="fr-FR"/>
           </a:p>
@@ -268,38 +269,37 @@
           <a:p>
             <a:pPr lvl="0"/>
             <a:r>
-              <a:rPr lang="fr-FR" smtClean="0"/>
+              <a:rPr lang="fr-FR"/>
               <a:t>Modifier les styles du texte du masque</a:t>
             </a:r>
           </a:p>
           <a:p>
             <a:pPr lvl="1"/>
             <a:r>
-              <a:rPr lang="fr-FR" smtClean="0"/>
+              <a:rPr lang="fr-FR"/>
               <a:t>Deuxième niveau</a:t>
             </a:r>
           </a:p>
           <a:p>
             <a:pPr lvl="2"/>
             <a:r>
-              <a:rPr lang="fr-FR" smtClean="0"/>
+              <a:rPr lang="fr-FR"/>
               <a:t>Troisième niveau</a:t>
             </a:r>
           </a:p>
           <a:p>
             <a:pPr lvl="3"/>
             <a:r>
-              <a:rPr lang="fr-FR" smtClean="0"/>
+              <a:rPr lang="fr-FR"/>
               <a:t>Quatrième niveau</a:t>
             </a:r>
           </a:p>
           <a:p>
             <a:pPr lvl="4"/>
             <a:r>
-              <a:rPr lang="fr-FR" smtClean="0"/>
+              <a:rPr lang="fr-FR"/>
               <a:t>Cinquième niveau</a:t>
             </a:r>
-            <a:endParaRPr lang="fr-FR"/>
           </a:p>
         </p:txBody>
       </p:sp>
@@ -601,11 +601,11 @@
           <a:lstStyle/>
           <a:p>
             <a:r>
-              <a:rPr lang="fr-FR" dirty="0" smtClean="0"/>
+              <a:rPr lang="fr-FR" dirty="0"/>
               <a:t>Diapo</a:t>
             </a:r>
             <a:r>
-              <a:rPr lang="fr-FR" baseline="0" dirty="0" smtClean="0"/>
+              <a:rPr lang="fr-FR" baseline="0" dirty="0"/>
               <a:t> de Charlotte: frise 20 ans </a:t>
             </a:r>
             <a:endParaRPr lang="fr-FR" dirty="0"/>
@@ -615,7 +615,7 @@
     </p:spTree>
     <p:extLst>
       <p:ext uri="{BB962C8B-B14F-4D97-AF65-F5344CB8AC3E}">
-        <p14:creationId xmlns:p14="http://schemas.microsoft.com/office/powerpoint/2010/main" val="4044723925"/>
+        <p14:creationId xmlns:p14="http://schemas.microsoft.com/office/powerpoint/2010/main" val="2251328978"/>
       </p:ext>
     </p:extLst>
   </p:cSld>
@@ -670,11 +670,11 @@
           <a:lstStyle/>
           <a:p>
             <a:r>
-              <a:rPr lang="fr-FR" dirty="0" smtClean="0"/>
+              <a:rPr lang="fr-FR" dirty="0"/>
               <a:t>Diapo</a:t>
             </a:r>
             <a:r>
-              <a:rPr lang="fr-FR" baseline="0" dirty="0" smtClean="0"/>
+              <a:rPr lang="fr-FR" baseline="0" dirty="0"/>
               <a:t> de Charlotte: frise 20 ans </a:t>
             </a:r>
             <a:endParaRPr lang="fr-FR" dirty="0"/>
@@ -684,7 +684,7 @@
     </p:spTree>
     <p:extLst>
       <p:ext uri="{BB962C8B-B14F-4D97-AF65-F5344CB8AC3E}">
-        <p14:creationId xmlns:p14="http://schemas.microsoft.com/office/powerpoint/2010/main" val="1653004253"/>
+        <p14:creationId xmlns:p14="http://schemas.microsoft.com/office/powerpoint/2010/main" val="4044723925"/>
       </p:ext>
     </p:extLst>
   </p:cSld>
@@ -739,11 +739,11 @@
           <a:lstStyle/>
           <a:p>
             <a:r>
-              <a:rPr lang="fr-FR" dirty="0" smtClean="0"/>
+              <a:rPr lang="fr-FR" dirty="0"/>
               <a:t>Diapo</a:t>
             </a:r>
             <a:r>
-              <a:rPr lang="fr-FR" baseline="0" dirty="0" smtClean="0"/>
+              <a:rPr lang="fr-FR" baseline="0" dirty="0"/>
               <a:t> de Charlotte: frise 20 ans </a:t>
             </a:r>
             <a:endParaRPr lang="fr-FR" dirty="0"/>
@@ -753,7 +753,7 @@
     </p:spTree>
     <p:extLst>
       <p:ext uri="{BB962C8B-B14F-4D97-AF65-F5344CB8AC3E}">
-        <p14:creationId xmlns:p14="http://schemas.microsoft.com/office/powerpoint/2010/main" val="3903803734"/>
+        <p14:creationId xmlns:p14="http://schemas.microsoft.com/office/powerpoint/2010/main" val="1653004253"/>
       </p:ext>
     </p:extLst>
   </p:cSld>
@@ -808,11 +808,11 @@
           <a:lstStyle/>
           <a:p>
             <a:r>
-              <a:rPr lang="fr-FR" dirty="0" smtClean="0"/>
+              <a:rPr lang="fr-FR" dirty="0"/>
               <a:t>Diapo</a:t>
             </a:r>
             <a:r>
-              <a:rPr lang="fr-FR" baseline="0" dirty="0" smtClean="0"/>
+              <a:rPr lang="fr-FR" baseline="0" dirty="0"/>
               <a:t> de Charlotte: frise 20 ans </a:t>
             </a:r>
             <a:endParaRPr lang="fr-FR" dirty="0"/>
@@ -822,7 +822,7 @@
     </p:spTree>
     <p:extLst>
       <p:ext uri="{BB962C8B-B14F-4D97-AF65-F5344CB8AC3E}">
-        <p14:creationId xmlns:p14="http://schemas.microsoft.com/office/powerpoint/2010/main" val="3380541025"/>
+        <p14:creationId xmlns:p14="http://schemas.microsoft.com/office/powerpoint/2010/main" val="3903803734"/>
       </p:ext>
     </p:extLst>
   </p:cSld>
@@ -877,11 +877,11 @@
           <a:lstStyle/>
           <a:p>
             <a:r>
-              <a:rPr lang="fr-FR" dirty="0" smtClean="0"/>
+              <a:rPr lang="fr-FR" dirty="0"/>
               <a:t>Diapo</a:t>
             </a:r>
             <a:r>
-              <a:rPr lang="fr-FR" baseline="0" dirty="0" smtClean="0"/>
+              <a:rPr lang="fr-FR" baseline="0" dirty="0"/>
               <a:t> de Charlotte: frise 20 ans </a:t>
             </a:r>
             <a:endParaRPr lang="fr-FR" dirty="0"/>
@@ -891,7 +891,7 @@
     </p:spTree>
     <p:extLst>
       <p:ext uri="{BB962C8B-B14F-4D97-AF65-F5344CB8AC3E}">
-        <p14:creationId xmlns:p14="http://schemas.microsoft.com/office/powerpoint/2010/main" val="1556126809"/>
+        <p14:creationId xmlns:p14="http://schemas.microsoft.com/office/powerpoint/2010/main" val="3380541025"/>
       </p:ext>
     </p:extLst>
   </p:cSld>
@@ -946,11 +946,80 @@
           <a:lstStyle/>
           <a:p>
             <a:r>
-              <a:rPr lang="fr-FR" dirty="0" smtClean="0"/>
+              <a:rPr lang="fr-FR" dirty="0"/>
               <a:t>Diapo</a:t>
             </a:r>
             <a:r>
-              <a:rPr lang="fr-FR" baseline="0" dirty="0" smtClean="0"/>
+              <a:rPr lang="fr-FR" baseline="0" dirty="0"/>
+              <a:t> de Charlotte: frise 20 ans </a:t>
+            </a:r>
+            <a:endParaRPr lang="fr-FR" dirty="0"/>
+          </a:p>
+        </p:txBody>
+      </p:sp>
+    </p:spTree>
+    <p:extLst>
+      <p:ext uri="{BB962C8B-B14F-4D97-AF65-F5344CB8AC3E}">
+        <p14:creationId xmlns:p14="http://schemas.microsoft.com/office/powerpoint/2010/main" val="1556126809"/>
+      </p:ext>
+    </p:extLst>
+  </p:cSld>
+  <p:clrMapOvr>
+    <a:masterClrMapping/>
+  </p:clrMapOvr>
+</p:notes>
+</file>
+
+<file path=ppt/notesSlides/notesSlide8.xml><?xml version="1.0" encoding="utf-8"?>
+<p:notes xmlns:a="http://schemas.openxmlformats.org/drawingml/2006/main" xmlns:r="http://schemas.openxmlformats.org/officeDocument/2006/relationships" xmlns:p="http://schemas.openxmlformats.org/presentationml/2006/main">
+  <p:cSld>
+    <p:spTree>
+      <p:nvGrpSpPr>
+        <p:cNvPr id="1" name=""/>
+        <p:cNvGrpSpPr/>
+        <p:nvPr/>
+      </p:nvGrpSpPr>
+      <p:grpSpPr>
+        <a:xfrm>
+          <a:off x="0" y="0"/>
+          <a:ext cx="0" cy="0"/>
+          <a:chOff x="0" y="0"/>
+          <a:chExt cx="0" cy="0"/>
+        </a:xfrm>
+      </p:grpSpPr>
+      <p:sp>
+        <p:nvSpPr>
+          <p:cNvPr id="2" name="Espace réservé de l'image des diapositives 1"/>
+          <p:cNvSpPr>
+            <a:spLocks noGrp="1" noRot="1" noChangeAspect="1"/>
+          </p:cNvSpPr>
+          <p:nvPr>
+            <p:ph type="sldImg"/>
+          </p:nvPr>
+        </p:nvSpPr>
+        <p:spPr/>
+      </p:sp>
+      <p:sp>
+        <p:nvSpPr>
+          <p:cNvPr id="3" name="Espace réservé des commentaires 2"/>
+          <p:cNvSpPr>
+            <a:spLocks noGrp="1"/>
+          </p:cNvSpPr>
+          <p:nvPr>
+            <p:ph type="body" idx="1"/>
+          </p:nvPr>
+        </p:nvSpPr>
+        <p:spPr/>
+        <p:txBody>
+          <a:bodyPr/>
+          <a:lstStyle/>
+          <a:p>
+            <a:r>
+              <a:rPr lang="fr-FR" dirty="0"/>
+              <a:t>Diapo</a:t>
+            </a:r>
+            <a:r>
+              <a:rPr lang="fr-FR" baseline="0" dirty="0"/>
               <a:t> de Charlotte: frise 20 ans </a:t>
             </a:r>
             <a:endParaRPr lang="fr-FR" dirty="0"/>
@@ -1012,10 +1081,9 @@
           </a:lstStyle>
           <a:p>
             <a:r>
-              <a:rPr lang="fr-FR" smtClean="0"/>
+              <a:rPr lang="fr-FR"/>
               <a:t>Modifiez le style du titre</a:t>
             </a:r>
-            <a:endParaRPr lang="fr-FR"/>
           </a:p>
         </p:txBody>
       </p:sp>
@@ -1077,10 +1145,9 @@
           </a:lstStyle>
           <a:p>
             <a:r>
-              <a:rPr lang="fr-FR" smtClean="0"/>
+              <a:rPr lang="fr-FR"/>
               <a:t>Modifier le style des sous-titres du masque</a:t>
             </a:r>
-            <a:endParaRPr lang="fr-FR"/>
           </a:p>
         </p:txBody>
       </p:sp>
@@ -1101,7 +1168,7 @@
           <a:p>
             <a:fld id="{4F6F4637-373D-4836-AA95-4B9D85F327C3}" type="datetimeFigureOut">
               <a:rPr lang="fr-FR" smtClean="0"/>
-              <a:t>09/11/2018</a:t>
+              <a:t>11/11/2018</a:t>
             </a:fld>
             <a:endParaRPr lang="fr-FR"/>
           </a:p>
@@ -1195,10 +1262,9 @@
           <a:lstStyle/>
           <a:p>
             <a:r>
-              <a:rPr lang="fr-FR" smtClean="0"/>
+              <a:rPr lang="fr-FR"/>
               <a:t>Modifiez le style du titre</a:t>
             </a:r>
-            <a:endParaRPr lang="fr-FR"/>
           </a:p>
         </p:txBody>
       </p:sp>
@@ -1219,38 +1285,37 @@
           <a:p>
             <a:pPr lvl="0"/>
             <a:r>
-              <a:rPr lang="fr-FR" smtClean="0"/>
+              <a:rPr lang="fr-FR"/>
               <a:t>Modifier les styles du texte du masque</a:t>
             </a:r>
           </a:p>
           <a:p>
             <a:pPr lvl="1"/>
             <a:r>
-              <a:rPr lang="fr-FR" smtClean="0"/>
+              <a:rPr lang="fr-FR"/>
               <a:t>Deuxième niveau</a:t>
             </a:r>
           </a:p>
           <a:p>
             <a:pPr lvl="2"/>
             <a:r>
-              <a:rPr lang="fr-FR" smtClean="0"/>
+              <a:rPr lang="fr-FR"/>
               <a:t>Troisième niveau</a:t>
             </a:r>
           </a:p>
           <a:p>
             <a:pPr lvl="3"/>
             <a:r>
-              <a:rPr lang="fr-FR" smtClean="0"/>
+              <a:rPr lang="fr-FR"/>
               <a:t>Quatrième niveau</a:t>
             </a:r>
           </a:p>
           <a:p>
             <a:pPr lvl="4"/>
             <a:r>
-              <a:rPr lang="fr-FR" smtClean="0"/>
+              <a:rPr lang="fr-FR"/>
               <a:t>Cinquième niveau</a:t>
             </a:r>
-            <a:endParaRPr lang="fr-FR"/>
           </a:p>
         </p:txBody>
       </p:sp>
@@ -1271,7 +1336,7 @@
           <a:p>
             <a:fld id="{4F6F4637-373D-4836-AA95-4B9D85F327C3}" type="datetimeFigureOut">
               <a:rPr lang="fr-FR" smtClean="0"/>
-              <a:t>09/11/2018</a:t>
+              <a:t>11/11/2018</a:t>
             </a:fld>
             <a:endParaRPr lang="fr-FR"/>
           </a:p>
@@ -1370,10 +1435,9 @@
           <a:lstStyle/>
           <a:p>
             <a:r>
-              <a:rPr lang="fr-FR" smtClean="0"/>
+              <a:rPr lang="fr-FR"/>
               <a:t>Modifiez le style du titre</a:t>
             </a:r>
-            <a:endParaRPr lang="fr-FR"/>
           </a:p>
         </p:txBody>
       </p:sp>
@@ -1399,38 +1463,37 @@
           <a:p>
             <a:pPr lvl="0"/>
             <a:r>
-              <a:rPr lang="fr-FR" smtClean="0"/>
+              <a:rPr lang="fr-FR"/>
               <a:t>Modifier les styles du texte du masque</a:t>
             </a:r>
           </a:p>
           <a:p>
             <a:pPr lvl="1"/>
             <a:r>
-              <a:rPr lang="fr-FR" smtClean="0"/>
+              <a:rPr lang="fr-FR"/>
               <a:t>Deuxième niveau</a:t>
             </a:r>
           </a:p>
           <a:p>
             <a:pPr lvl="2"/>
             <a:r>
-              <a:rPr lang="fr-FR" smtClean="0"/>
+              <a:rPr lang="fr-FR"/>
               <a:t>Troisième niveau</a:t>
             </a:r>
           </a:p>
           <a:p>
             <a:pPr lvl="3"/>
             <a:r>
-              <a:rPr lang="fr-FR" smtClean="0"/>
+              <a:rPr lang="fr-FR"/>
               <a:t>Quatrième niveau</a:t>
             </a:r>
           </a:p>
           <a:p>
             <a:pPr lvl="4"/>
             <a:r>
-              <a:rPr lang="fr-FR" smtClean="0"/>
+              <a:rPr lang="fr-FR"/>
               <a:t>Cinquième niveau</a:t>
             </a:r>
-            <a:endParaRPr lang="fr-FR"/>
           </a:p>
         </p:txBody>
       </p:sp>
@@ -1451,7 +1514,7 @@
           <a:p>
             <a:fld id="{4F6F4637-373D-4836-AA95-4B9D85F327C3}" type="datetimeFigureOut">
               <a:rPr lang="fr-FR" smtClean="0"/>
-              <a:t>09/11/2018</a:t>
+              <a:t>11/11/2018</a:t>
             </a:fld>
             <a:endParaRPr lang="fr-FR"/>
           </a:p>
@@ -1561,7 +1624,7 @@
           </a:lstStyle>
           <a:p>
             <a:r>
-              <a:rPr lang="fr-FR" smtClean="0"/>
+              <a:rPr lang="fr-FR"/>
               <a:t>Modifiez le style du titre</a:t>
             </a:r>
             <a:endParaRPr lang="fr-FR" dirty="0"/>
@@ -1681,10 +1744,9 @@
           </a:lstStyle>
           <a:p>
             <a:r>
-              <a:rPr lang="fr-FR" dirty="0" smtClean="0"/>
+              <a:rPr lang="fr-FR" dirty="0"/>
               <a:t>US14-Orphanet</a:t>
             </a:r>
-            <a:endParaRPr lang="fr-FR" dirty="0"/>
           </a:p>
         </p:txBody>
       </p:sp>
@@ -1723,7 +1785,7 @@
           </a:lstStyle>
           <a:p>
             <a:r>
-              <a:rPr lang="fr-FR" smtClean="0"/>
+              <a:rPr lang="fr-FR"/>
               <a:t>7 mars 2018</a:t>
             </a:r>
             <a:endParaRPr lang="fr-FR" dirty="0"/>
@@ -1822,38 +1884,38 @@
           <a:p>
             <a:pPr lvl="0"/>
             <a:r>
-              <a:rPr lang="fr-FR" smtClean="0"/>
+              <a:rPr lang="fr-FR"/>
               <a:t>Modifier les styles du texte du masque</a:t>
             </a:r>
           </a:p>
           <a:p>
             <a:pPr lvl="1"/>
             <a:r>
-              <a:rPr lang="fr-FR" smtClean="0"/>
+              <a:rPr lang="fr-FR"/>
               <a:t>Deuxième niveau</a:t>
             </a:r>
           </a:p>
           <a:p>
             <a:pPr lvl="2"/>
             <a:r>
-              <a:rPr lang="fr-FR" smtClean="0"/>
+              <a:rPr lang="fr-FR"/>
               <a:t>Troisième niveau</a:t>
             </a:r>
           </a:p>
           <a:p>
             <a:pPr lvl="3"/>
             <a:r>
-              <a:rPr lang="fr-FR" smtClean="0"/>
+              <a:rPr lang="fr-FR"/>
               <a:t>Quatrième niveau</a:t>
             </a:r>
           </a:p>
           <a:p>
             <a:pPr lvl="4"/>
             <a:r>
-              <a:rPr lang="fr-FR" smtClean="0"/>
+              <a:rPr lang="fr-FR"/>
               <a:t>Cinquième niveau</a:t>
             </a:r>
-            <a:endParaRPr lang="fr-FR" dirty="0" smtClean="0"/>
+            <a:endParaRPr lang="fr-FR" dirty="0"/>
           </a:p>
         </p:txBody>
       </p:sp>
@@ -1867,13 +1929,6 @@
   <p:clrMapOvr>
     <a:masterClrMapping/>
   </p:clrMapOvr>
-  <p:timing>
-    <p:tnLst>
-      <p:par>
-        <p:cTn id="1" dur="indefinite" restart="never" nodeType="tmRoot"/>
-      </p:par>
-    </p:tnLst>
-  </p:timing>
   <p:extLst mod="1">
     <p:ext uri="{DCECCB84-F9BA-43D5-87BE-67443E8EF086}">
       <p15:sldGuideLst xmlns:p15="http://schemas.microsoft.com/office/powerpoint/2012/main"/>
@@ -2361,18 +2416,13 @@
           <a:p>
             <a:pPr lvl="0" algn="r"/>
             <a:r>
-              <a:rPr lang="en-US" sz="2000" dirty="0" smtClean="0">
+              <a:rPr lang="en-US" sz="2000" dirty="0">
                 <a:solidFill>
                   <a:schemeClr val="tx2"/>
                 </a:solidFill>
               </a:rPr>
               <a:t>ELIXIR H-CNV community meeting September 28th 2018</a:t>
             </a:r>
-            <a:endParaRPr lang="en-US" sz="2000" dirty="0">
-              <a:solidFill>
-                <a:schemeClr val="tx2"/>
-              </a:solidFill>
-            </a:endParaRPr>
           </a:p>
         </p:txBody>
       </p:sp>
@@ -2422,10 +2472,9 @@
           <a:lstStyle/>
           <a:p>
             <a:r>
-              <a:rPr lang="fr-FR" smtClean="0"/>
+              <a:rPr lang="fr-FR"/>
               <a:t>Modifiez le style du titre</a:t>
             </a:r>
-            <a:endParaRPr lang="fr-FR"/>
           </a:p>
         </p:txBody>
       </p:sp>
@@ -2446,38 +2495,37 @@
           <a:p>
             <a:pPr lvl="0"/>
             <a:r>
-              <a:rPr lang="fr-FR" smtClean="0"/>
+              <a:rPr lang="fr-FR"/>
               <a:t>Modifier les styles du texte du masque</a:t>
             </a:r>
           </a:p>
           <a:p>
             <a:pPr lvl="1"/>
             <a:r>
-              <a:rPr lang="fr-FR" smtClean="0"/>
+              <a:rPr lang="fr-FR"/>
               <a:t>Deuxième niveau</a:t>
             </a:r>
           </a:p>
           <a:p>
             <a:pPr lvl="2"/>
             <a:r>
-              <a:rPr lang="fr-FR" smtClean="0"/>
+              <a:rPr lang="fr-FR"/>
               <a:t>Troisième niveau</a:t>
             </a:r>
           </a:p>
           <a:p>
             <a:pPr lvl="3"/>
             <a:r>
-              <a:rPr lang="fr-FR" smtClean="0"/>
+              <a:rPr lang="fr-FR"/>
               <a:t>Quatrième niveau</a:t>
             </a:r>
           </a:p>
           <a:p>
             <a:pPr lvl="4"/>
             <a:r>
-              <a:rPr lang="fr-FR" smtClean="0"/>
+              <a:rPr lang="fr-FR"/>
               <a:t>Cinquième niveau</a:t>
             </a:r>
-            <a:endParaRPr lang="fr-FR"/>
           </a:p>
         </p:txBody>
       </p:sp>
@@ -2498,7 +2546,7 @@
           <a:p>
             <a:fld id="{4F6F4637-373D-4836-AA95-4B9D85F327C3}" type="datetimeFigureOut">
               <a:rPr lang="fr-FR" smtClean="0"/>
-              <a:t>09/11/2018</a:t>
+              <a:t>11/11/2018</a:t>
             </a:fld>
             <a:endParaRPr lang="fr-FR"/>
           </a:p>
@@ -2601,10 +2649,9 @@
           </a:lstStyle>
           <a:p>
             <a:r>
-              <a:rPr lang="fr-FR" smtClean="0"/>
+              <a:rPr lang="fr-FR"/>
               <a:t>Modifiez le style du titre</a:t>
             </a:r>
-            <a:endParaRPr lang="fr-FR"/>
           </a:p>
         </p:txBody>
       </p:sp>
@@ -2721,7 +2768,7 @@
           <a:p>
             <a:pPr lvl="0"/>
             <a:r>
-              <a:rPr lang="fr-FR" smtClean="0"/>
+              <a:rPr lang="fr-FR"/>
               <a:t>Modifier les styles du texte du masque</a:t>
             </a:r>
           </a:p>
@@ -2744,7 +2791,7 @@
           <a:p>
             <a:fld id="{4F6F4637-373D-4836-AA95-4B9D85F327C3}" type="datetimeFigureOut">
               <a:rPr lang="fr-FR" smtClean="0"/>
-              <a:t>09/11/2018</a:t>
+              <a:t>11/11/2018</a:t>
             </a:fld>
             <a:endParaRPr lang="fr-FR"/>
           </a:p>
@@ -2838,10 +2885,9 @@
           <a:lstStyle/>
           <a:p>
             <a:r>
-              <a:rPr lang="fr-FR" smtClean="0"/>
+              <a:rPr lang="fr-FR"/>
               <a:t>Modifiez le style du titre</a:t>
             </a:r>
-            <a:endParaRPr lang="fr-FR"/>
           </a:p>
         </p:txBody>
       </p:sp>
@@ -2867,38 +2913,37 @@
           <a:p>
             <a:pPr lvl="0"/>
             <a:r>
-              <a:rPr lang="fr-FR" smtClean="0"/>
+              <a:rPr lang="fr-FR"/>
               <a:t>Modifier les styles du texte du masque</a:t>
             </a:r>
           </a:p>
           <a:p>
             <a:pPr lvl="1"/>
             <a:r>
-              <a:rPr lang="fr-FR" smtClean="0"/>
+              <a:rPr lang="fr-FR"/>
               <a:t>Deuxième niveau</a:t>
             </a:r>
           </a:p>
           <a:p>
             <a:pPr lvl="2"/>
             <a:r>
-              <a:rPr lang="fr-FR" smtClean="0"/>
+              <a:rPr lang="fr-FR"/>
               <a:t>Troisième niveau</a:t>
             </a:r>
           </a:p>
           <a:p>
             <a:pPr lvl="3"/>
             <a:r>
-              <a:rPr lang="fr-FR" smtClean="0"/>
+              <a:rPr lang="fr-FR"/>
               <a:t>Quatrième niveau</a:t>
             </a:r>
           </a:p>
           <a:p>
             <a:pPr lvl="4"/>
             <a:r>
-              <a:rPr lang="fr-FR" smtClean="0"/>
+              <a:rPr lang="fr-FR"/>
               <a:t>Cinquième niveau</a:t>
             </a:r>
-            <a:endParaRPr lang="fr-FR"/>
           </a:p>
         </p:txBody>
       </p:sp>
@@ -2924,38 +2969,37 @@
           <a:p>
             <a:pPr lvl="0"/>
             <a:r>
-              <a:rPr lang="fr-FR" smtClean="0"/>
+              <a:rPr lang="fr-FR"/>
               <a:t>Modifier les styles du texte du masque</a:t>
             </a:r>
           </a:p>
           <a:p>
             <a:pPr lvl="1"/>
             <a:r>
-              <a:rPr lang="fr-FR" smtClean="0"/>
+              <a:rPr lang="fr-FR"/>
               <a:t>Deuxième niveau</a:t>
             </a:r>
           </a:p>
           <a:p>
             <a:pPr lvl="2"/>
             <a:r>
-              <a:rPr lang="fr-FR" smtClean="0"/>
+              <a:rPr lang="fr-FR"/>
               <a:t>Troisième niveau</a:t>
             </a:r>
           </a:p>
           <a:p>
             <a:pPr lvl="3"/>
             <a:r>
-              <a:rPr lang="fr-FR" smtClean="0"/>
+              <a:rPr lang="fr-FR"/>
               <a:t>Quatrième niveau</a:t>
             </a:r>
           </a:p>
           <a:p>
             <a:pPr lvl="4"/>
             <a:r>
-              <a:rPr lang="fr-FR" smtClean="0"/>
+              <a:rPr lang="fr-FR"/>
               <a:t>Cinquième niveau</a:t>
             </a:r>
-            <a:endParaRPr lang="fr-FR"/>
           </a:p>
         </p:txBody>
       </p:sp>
@@ -2976,7 +3020,7 @@
           <a:p>
             <a:fld id="{4F6F4637-373D-4836-AA95-4B9D85F327C3}" type="datetimeFigureOut">
               <a:rPr lang="fr-FR" smtClean="0"/>
-              <a:t>09/11/2018</a:t>
+              <a:t>11/11/2018</a:t>
             </a:fld>
             <a:endParaRPr lang="fr-FR"/>
           </a:p>
@@ -3075,10 +3119,9 @@
           <a:lstStyle/>
           <a:p>
             <a:r>
-              <a:rPr lang="fr-FR" smtClean="0"/>
+              <a:rPr lang="fr-FR"/>
               <a:t>Modifiez le style du titre</a:t>
             </a:r>
-            <a:endParaRPr lang="fr-FR"/>
           </a:p>
         </p:txBody>
       </p:sp>
@@ -3141,7 +3184,7 @@
           <a:p>
             <a:pPr lvl="0"/>
             <a:r>
-              <a:rPr lang="fr-FR" smtClean="0"/>
+              <a:rPr lang="fr-FR"/>
               <a:t>Modifier les styles du texte du masque</a:t>
             </a:r>
           </a:p>
@@ -3169,38 +3212,37 @@
           <a:p>
             <a:pPr lvl="0"/>
             <a:r>
-              <a:rPr lang="fr-FR" smtClean="0"/>
+              <a:rPr lang="fr-FR"/>
               <a:t>Modifier les styles du texte du masque</a:t>
             </a:r>
           </a:p>
           <a:p>
             <a:pPr lvl="1"/>
             <a:r>
-              <a:rPr lang="fr-FR" smtClean="0"/>
+              <a:rPr lang="fr-FR"/>
               <a:t>Deuxième niveau</a:t>
             </a:r>
           </a:p>
           <a:p>
             <a:pPr lvl="2"/>
             <a:r>
-              <a:rPr lang="fr-FR" smtClean="0"/>
+              <a:rPr lang="fr-FR"/>
               <a:t>Troisième niveau</a:t>
             </a:r>
           </a:p>
           <a:p>
             <a:pPr lvl="3"/>
             <a:r>
-              <a:rPr lang="fr-FR" smtClean="0"/>
+              <a:rPr lang="fr-FR"/>
               <a:t>Quatrième niveau</a:t>
             </a:r>
           </a:p>
           <a:p>
             <a:pPr lvl="4"/>
             <a:r>
-              <a:rPr lang="fr-FR" smtClean="0"/>
+              <a:rPr lang="fr-FR"/>
               <a:t>Cinquième niveau</a:t>
             </a:r>
-            <a:endParaRPr lang="fr-FR"/>
           </a:p>
         </p:txBody>
       </p:sp>
@@ -3263,7 +3305,7 @@
           <a:p>
             <a:pPr lvl="0"/>
             <a:r>
-              <a:rPr lang="fr-FR" smtClean="0"/>
+              <a:rPr lang="fr-FR"/>
               <a:t>Modifier les styles du texte du masque</a:t>
             </a:r>
           </a:p>
@@ -3291,38 +3333,37 @@
           <a:p>
             <a:pPr lvl="0"/>
             <a:r>
-              <a:rPr lang="fr-FR" smtClean="0"/>
+              <a:rPr lang="fr-FR"/>
               <a:t>Modifier les styles du texte du masque</a:t>
             </a:r>
           </a:p>
           <a:p>
             <a:pPr lvl="1"/>
             <a:r>
-              <a:rPr lang="fr-FR" smtClean="0"/>
+              <a:rPr lang="fr-FR"/>
               <a:t>Deuxième niveau</a:t>
             </a:r>
           </a:p>
           <a:p>
             <a:pPr lvl="2"/>
             <a:r>
-              <a:rPr lang="fr-FR" smtClean="0"/>
+              <a:rPr lang="fr-FR"/>
               <a:t>Troisième niveau</a:t>
             </a:r>
           </a:p>
           <a:p>
             <a:pPr lvl="3"/>
             <a:r>
-              <a:rPr lang="fr-FR" smtClean="0"/>
+              <a:rPr lang="fr-FR"/>
               <a:t>Quatrième niveau</a:t>
             </a:r>
           </a:p>
           <a:p>
             <a:pPr lvl="4"/>
             <a:r>
-              <a:rPr lang="fr-FR" smtClean="0"/>
+              <a:rPr lang="fr-FR"/>
               <a:t>Cinquième niveau</a:t>
             </a:r>
-            <a:endParaRPr lang="fr-FR"/>
           </a:p>
         </p:txBody>
       </p:sp>
@@ -3343,7 +3384,7 @@
           <a:p>
             <a:fld id="{4F6F4637-373D-4836-AA95-4B9D85F327C3}" type="datetimeFigureOut">
               <a:rPr lang="fr-FR" smtClean="0"/>
-              <a:t>09/11/2018</a:t>
+              <a:t>11/11/2018</a:t>
             </a:fld>
             <a:endParaRPr lang="fr-FR"/>
           </a:p>
@@ -3437,10 +3478,9 @@
           <a:lstStyle/>
           <a:p>
             <a:r>
-              <a:rPr lang="fr-FR" smtClean="0"/>
+              <a:rPr lang="fr-FR"/>
               <a:t>Modifiez le style du titre</a:t>
             </a:r>
-            <a:endParaRPr lang="fr-FR"/>
           </a:p>
         </p:txBody>
       </p:sp>
@@ -3461,7 +3501,7 @@
           <a:p>
             <a:fld id="{4F6F4637-373D-4836-AA95-4B9D85F327C3}" type="datetimeFigureOut">
               <a:rPr lang="fr-FR" smtClean="0"/>
-              <a:t>09/11/2018</a:t>
+              <a:t>11/11/2018</a:t>
             </a:fld>
             <a:endParaRPr lang="fr-FR"/>
           </a:p>
@@ -3556,7 +3596,7 @@
           <a:p>
             <a:fld id="{4F6F4637-373D-4836-AA95-4B9D85F327C3}" type="datetimeFigureOut">
               <a:rPr lang="fr-FR" smtClean="0"/>
-              <a:t>09/11/2018</a:t>
+              <a:t>11/11/2018</a:t>
             </a:fld>
             <a:endParaRPr lang="fr-FR"/>
           </a:p>
@@ -3659,10 +3699,9 @@
           </a:lstStyle>
           <a:p>
             <a:r>
-              <a:rPr lang="fr-FR" smtClean="0"/>
+              <a:rPr lang="fr-FR"/>
               <a:t>Modifiez le style du titre</a:t>
             </a:r>
-            <a:endParaRPr lang="fr-FR"/>
           </a:p>
         </p:txBody>
       </p:sp>
@@ -3716,38 +3755,37 @@
           <a:p>
             <a:pPr lvl="0"/>
             <a:r>
-              <a:rPr lang="fr-FR" smtClean="0"/>
+              <a:rPr lang="fr-FR"/>
               <a:t>Modifier les styles du texte du masque</a:t>
             </a:r>
           </a:p>
           <a:p>
             <a:pPr lvl="1"/>
             <a:r>
-              <a:rPr lang="fr-FR" smtClean="0"/>
+              <a:rPr lang="fr-FR"/>
               <a:t>Deuxième niveau</a:t>
             </a:r>
           </a:p>
           <a:p>
             <a:pPr lvl="2"/>
             <a:r>
-              <a:rPr lang="fr-FR" smtClean="0"/>
+              <a:rPr lang="fr-FR"/>
               <a:t>Troisième niveau</a:t>
             </a:r>
           </a:p>
           <a:p>
             <a:pPr lvl="3"/>
             <a:r>
-              <a:rPr lang="fr-FR" smtClean="0"/>
+              <a:rPr lang="fr-FR"/>
               <a:t>Quatrième niveau</a:t>
             </a:r>
           </a:p>
           <a:p>
             <a:pPr lvl="4"/>
             <a:r>
-              <a:rPr lang="fr-FR" smtClean="0"/>
+              <a:rPr lang="fr-FR"/>
               <a:t>Cinquième niveau</a:t>
             </a:r>
-            <a:endParaRPr lang="fr-FR"/>
           </a:p>
         </p:txBody>
       </p:sp>
@@ -3810,7 +3848,7 @@
           <a:p>
             <a:pPr lvl="0"/>
             <a:r>
-              <a:rPr lang="fr-FR" smtClean="0"/>
+              <a:rPr lang="fr-FR"/>
               <a:t>Modifier les styles du texte du masque</a:t>
             </a:r>
           </a:p>
@@ -3833,7 +3871,7 @@
           <a:p>
             <a:fld id="{4F6F4637-373D-4836-AA95-4B9D85F327C3}" type="datetimeFigureOut">
               <a:rPr lang="fr-FR" smtClean="0"/>
-              <a:t>09/11/2018</a:t>
+              <a:t>11/11/2018</a:t>
             </a:fld>
             <a:endParaRPr lang="fr-FR"/>
           </a:p>
@@ -3936,10 +3974,9 @@
           </a:lstStyle>
           <a:p>
             <a:r>
-              <a:rPr lang="fr-FR" smtClean="0"/>
+              <a:rPr lang="fr-FR"/>
               <a:t>Modifiez le style du titre</a:t>
             </a:r>
-            <a:endParaRPr lang="fr-FR"/>
           </a:p>
         </p:txBody>
       </p:sp>
@@ -4063,7 +4100,7 @@
           <a:p>
             <a:pPr lvl="0"/>
             <a:r>
-              <a:rPr lang="fr-FR" smtClean="0"/>
+              <a:rPr lang="fr-FR"/>
               <a:t>Modifier les styles du texte du masque</a:t>
             </a:r>
           </a:p>
@@ -4086,7 +4123,7 @@
           <a:p>
             <a:fld id="{4F6F4637-373D-4836-AA95-4B9D85F327C3}" type="datetimeFigureOut">
               <a:rPr lang="fr-FR" smtClean="0"/>
-              <a:t>09/11/2018</a:t>
+              <a:t>11/11/2018</a:t>
             </a:fld>
             <a:endParaRPr lang="fr-FR"/>
           </a:p>
@@ -4195,10 +4232,9 @@
           <a:lstStyle/>
           <a:p>
             <a:r>
-              <a:rPr lang="fr-FR" smtClean="0"/>
+              <a:rPr lang="fr-FR"/>
               <a:t>Modifiez le style du titre</a:t>
             </a:r>
-            <a:endParaRPr lang="fr-FR"/>
           </a:p>
         </p:txBody>
       </p:sp>
@@ -4229,38 +4265,37 @@
           <a:p>
             <a:pPr lvl="0"/>
             <a:r>
-              <a:rPr lang="fr-FR" smtClean="0"/>
+              <a:rPr lang="fr-FR"/>
               <a:t>Modifier les styles du texte du masque</a:t>
             </a:r>
           </a:p>
           <a:p>
             <a:pPr lvl="1"/>
             <a:r>
-              <a:rPr lang="fr-FR" smtClean="0"/>
+              <a:rPr lang="fr-FR"/>
               <a:t>Deuxième niveau</a:t>
             </a:r>
           </a:p>
           <a:p>
             <a:pPr lvl="2"/>
             <a:r>
-              <a:rPr lang="fr-FR" smtClean="0"/>
+              <a:rPr lang="fr-FR"/>
               <a:t>Troisième niveau</a:t>
             </a:r>
           </a:p>
           <a:p>
             <a:pPr lvl="3"/>
             <a:r>
-              <a:rPr lang="fr-FR" smtClean="0"/>
+              <a:rPr lang="fr-FR"/>
               <a:t>Quatrième niveau</a:t>
             </a:r>
           </a:p>
           <a:p>
             <a:pPr lvl="4"/>
             <a:r>
-              <a:rPr lang="fr-FR" smtClean="0"/>
+              <a:rPr lang="fr-FR"/>
               <a:t>Cinquième niveau</a:t>
             </a:r>
-            <a:endParaRPr lang="fr-FR"/>
           </a:p>
         </p:txBody>
       </p:sp>
@@ -4299,7 +4334,7 @@
           <a:p>
             <a:fld id="{4F6F4637-373D-4836-AA95-4B9D85F327C3}" type="datetimeFigureOut">
               <a:rPr lang="fr-FR" smtClean="0"/>
-              <a:t>09/11/2018</a:t>
+              <a:t>11/11/2018</a:t>
             </a:fld>
             <a:endParaRPr lang="fr-FR"/>
           </a:p>
@@ -4730,13 +4765,8 @@
           <a:p>
             <a:r>
               <a:rPr lang="en-US" sz="4000" dirty="0"/>
-              <a:t>Development of a catalog of federated SPARQL queries in the field of Rare Diseases</a:t>
-            </a:r>
-            <a:r>
-              <a:rPr lang="en-US" sz="4000" dirty="0" smtClean="0"/>
-              <a:t> </a:t>
-            </a:r>
-            <a:endParaRPr lang="en-US" sz="4000" dirty="0"/>
+              <a:t>Development of a catalog of federated SPARQL queries in the field of Rare Diseases </a:t>
+            </a:r>
           </a:p>
         </p:txBody>
       </p:sp>
@@ -4763,14 +4793,14 @@
           <a:lstStyle/>
           <a:p>
             <a:r>
-              <a:rPr lang="en-US" smtClean="0"/>
+              <a:rPr lang="en-US"/>
               <a:t>Marc Hanauer</a:t>
             </a:r>
             <a:br>
-              <a:rPr lang="en-US" smtClean="0"/>
+              <a:rPr lang="en-US"/>
             </a:br>
             <a:r>
-              <a:rPr lang="en-US" smtClean="0"/>
+              <a:rPr lang="en-US"/>
               <a:t>marc.hanauer@inserm.fr </a:t>
             </a:r>
             <a:endParaRPr lang="en-US" dirty="0"/>
@@ -4975,13 +5005,6 @@
   <p:clrMapOvr>
     <a:masterClrMapping/>
   </p:clrMapOvr>
-  <p:timing>
-    <p:tnLst>
-      <p:par>
-        <p:cTn id="1" dur="indefinite" restart="never" nodeType="tmRoot"/>
-      </p:par>
-    </p:tnLst>
-  </p:timing>
 </p:sld>
 </file>
 
@@ -5077,7 +5100,7 @@
           </a:lstStyle>
           <a:p>
             <a:r>
-              <a:rPr lang="fr-FR" sz="2000" b="1" smtClean="0">
+              <a:rPr lang="fr-FR" sz="2000" b="1">
                 <a:solidFill>
                   <a:schemeClr val="tx1"/>
                 </a:solidFill>
@@ -5173,10 +5196,10 @@
       </p:pic>
       <p:pic>
         <p:nvPicPr>
-          <p:cNvPr id="15" name="Image 14">
+          <p:cNvPr id="5" name="Image 4">
             <a:extLst>
               <a:ext uri="{FF2B5EF4-FFF2-40B4-BE49-F238E27FC236}">
-                <a16:creationId xmlns:a16="http://schemas.microsoft.com/office/drawing/2014/main" xmlns="" id="{FA8E8004-557F-46D4-9DED-C438ACD76E2A}"/>
+                <a16:creationId xmlns:a16="http://schemas.microsoft.com/office/drawing/2014/main" id="{5485954E-E493-4B6B-A640-43C81FBCD285}"/>
               </a:ext>
             </a:extLst>
           </p:cNvPr>
@@ -5199,18 +5222,289 @@
         </p:blipFill>
         <p:spPr>
           <a:xfrm>
-            <a:off x="823721" y="1115468"/>
-            <a:ext cx="10321879" cy="4919572"/>
+            <a:off x="1827074" y="1027729"/>
+            <a:ext cx="8537851" cy="4802541"/>
           </a:xfrm>
           <a:prstGeom prst="rect">
             <a:avLst/>
           </a:prstGeom>
         </p:spPr>
       </p:pic>
+      <p:grpSp>
+        <p:nvGrpSpPr>
+          <p:cNvPr id="7" name="Groupe 6">
+            <a:extLst>
+              <a:ext uri="{FF2B5EF4-FFF2-40B4-BE49-F238E27FC236}">
+                <a16:creationId xmlns:a16="http://schemas.microsoft.com/office/drawing/2014/main" id="{AA25DEE6-AC3D-4A49-B281-2AEADD47F951}"/>
+              </a:ext>
+            </a:extLst>
+          </p:cNvPr>
+          <p:cNvGrpSpPr/>
+          <p:nvPr/>
+        </p:nvGrpSpPr>
+        <p:grpSpPr>
+          <a:xfrm>
+            <a:off x="2932651" y="1954635"/>
+            <a:ext cx="6326698" cy="3851813"/>
+            <a:chOff x="2932651" y="1954635"/>
+            <a:chExt cx="6326698" cy="3851813"/>
+          </a:xfrm>
+        </p:grpSpPr>
+        <p:sp>
+          <p:nvSpPr>
+            <p:cNvPr id="6" name="Rectangle : coins arrondis 5">
+              <a:extLst>
+                <a:ext uri="{FF2B5EF4-FFF2-40B4-BE49-F238E27FC236}">
+                  <a16:creationId xmlns:a16="http://schemas.microsoft.com/office/drawing/2014/main" id="{3AFD473F-2FAF-4FDB-8869-6622066489DC}"/>
+                </a:ext>
+              </a:extLst>
+            </p:cNvPr>
+            <p:cNvSpPr/>
+            <p:nvPr/>
+          </p:nvSpPr>
+          <p:spPr>
+            <a:xfrm>
+              <a:off x="3095538" y="4118994"/>
+              <a:ext cx="1518407" cy="620786"/>
+            </a:xfrm>
+            <a:prstGeom prst="roundRect">
+              <a:avLst/>
+            </a:prstGeom>
+            <a:noFill/>
+            <a:ln w="38100">
+              <a:solidFill>
+                <a:srgbClr val="C00000"/>
+              </a:solidFill>
+            </a:ln>
+          </p:spPr>
+          <p:style>
+            <a:lnRef idx="1">
+              <a:schemeClr val="accent2"/>
+            </a:lnRef>
+            <a:fillRef idx="3">
+              <a:schemeClr val="accent2"/>
+            </a:fillRef>
+            <a:effectRef idx="2">
+              <a:schemeClr val="accent2"/>
+            </a:effectRef>
+            <a:fontRef idx="minor">
+              <a:schemeClr val="lt1"/>
+            </a:fontRef>
+          </p:style>
+          <p:txBody>
+            <a:bodyPr rtlCol="0" anchor="ctr"/>
+            <a:lstStyle/>
+            <a:p>
+              <a:pPr algn="ctr"/>
+              <a:endParaRPr lang="fr-FR"/>
+            </a:p>
+          </p:txBody>
+        </p:sp>
+        <p:sp>
+          <p:nvSpPr>
+            <p:cNvPr id="11" name="Rectangle : coins arrondis 10">
+              <a:extLst>
+                <a:ext uri="{FF2B5EF4-FFF2-40B4-BE49-F238E27FC236}">
+                  <a16:creationId xmlns:a16="http://schemas.microsoft.com/office/drawing/2014/main" id="{418E3B46-84BB-44D1-BD4E-11ECF819B0D0}"/>
+                </a:ext>
+              </a:extLst>
+            </p:cNvPr>
+            <p:cNvSpPr/>
+            <p:nvPr/>
+          </p:nvSpPr>
+          <p:spPr>
+            <a:xfrm>
+              <a:off x="4867014" y="2818701"/>
+              <a:ext cx="1844179" cy="1166070"/>
+            </a:xfrm>
+            <a:prstGeom prst="roundRect">
+              <a:avLst/>
+            </a:prstGeom>
+            <a:noFill/>
+            <a:ln w="38100">
+              <a:solidFill>
+                <a:srgbClr val="C00000"/>
+              </a:solidFill>
+            </a:ln>
+          </p:spPr>
+          <p:style>
+            <a:lnRef idx="1">
+              <a:schemeClr val="accent2"/>
+            </a:lnRef>
+            <a:fillRef idx="3">
+              <a:schemeClr val="accent2"/>
+            </a:fillRef>
+            <a:effectRef idx="2">
+              <a:schemeClr val="accent2"/>
+            </a:effectRef>
+            <a:fontRef idx="minor">
+              <a:schemeClr val="lt1"/>
+            </a:fontRef>
+          </p:style>
+          <p:txBody>
+            <a:bodyPr rtlCol="0" anchor="ctr"/>
+            <a:lstStyle/>
+            <a:p>
+              <a:pPr algn="ctr"/>
+              <a:endParaRPr lang="fr-FR"/>
+            </a:p>
+          </p:txBody>
+        </p:sp>
+        <p:sp>
+          <p:nvSpPr>
+            <p:cNvPr id="12" name="Rectangle : coins arrondis 11">
+              <a:extLst>
+                <a:ext uri="{FF2B5EF4-FFF2-40B4-BE49-F238E27FC236}">
+                  <a16:creationId xmlns:a16="http://schemas.microsoft.com/office/drawing/2014/main" id="{88FC58F6-E2FE-45B5-B49C-5FD259573155}"/>
+                </a:ext>
+              </a:extLst>
+            </p:cNvPr>
+            <p:cNvSpPr/>
+            <p:nvPr/>
+          </p:nvSpPr>
+          <p:spPr>
+            <a:xfrm>
+              <a:off x="2932651" y="1954635"/>
+              <a:ext cx="1622571" cy="864066"/>
+            </a:xfrm>
+            <a:prstGeom prst="roundRect">
+              <a:avLst/>
+            </a:prstGeom>
+            <a:noFill/>
+            <a:ln w="38100">
+              <a:solidFill>
+                <a:srgbClr val="C00000"/>
+              </a:solidFill>
+            </a:ln>
+          </p:spPr>
+          <p:style>
+            <a:lnRef idx="1">
+              <a:schemeClr val="accent2"/>
+            </a:lnRef>
+            <a:fillRef idx="3">
+              <a:schemeClr val="accent2"/>
+            </a:fillRef>
+            <a:effectRef idx="2">
+              <a:schemeClr val="accent2"/>
+            </a:effectRef>
+            <a:fontRef idx="minor">
+              <a:schemeClr val="lt1"/>
+            </a:fontRef>
+          </p:style>
+          <p:txBody>
+            <a:bodyPr rtlCol="0" anchor="ctr"/>
+            <a:lstStyle/>
+            <a:p>
+              <a:pPr algn="ctr"/>
+              <a:endParaRPr lang="fr-FR"/>
+            </a:p>
+          </p:txBody>
+        </p:sp>
+        <p:sp>
+          <p:nvSpPr>
+            <p:cNvPr id="16" name="Rectangle : coins arrondis 15">
+              <a:extLst>
+                <a:ext uri="{FF2B5EF4-FFF2-40B4-BE49-F238E27FC236}">
+                  <a16:creationId xmlns:a16="http://schemas.microsoft.com/office/drawing/2014/main" id="{198543B8-F3C9-4C0E-900C-89E126C84176}"/>
+                </a:ext>
+              </a:extLst>
+            </p:cNvPr>
+            <p:cNvSpPr/>
+            <p:nvPr/>
+          </p:nvSpPr>
+          <p:spPr>
+            <a:xfrm>
+              <a:off x="6516148" y="2021747"/>
+              <a:ext cx="2743201" cy="1065401"/>
+            </a:xfrm>
+            <a:prstGeom prst="roundRect">
+              <a:avLst/>
+            </a:prstGeom>
+            <a:noFill/>
+            <a:ln w="38100">
+              <a:solidFill>
+                <a:srgbClr val="C00000"/>
+              </a:solidFill>
+            </a:ln>
+          </p:spPr>
+          <p:style>
+            <a:lnRef idx="1">
+              <a:schemeClr val="accent2"/>
+            </a:lnRef>
+            <a:fillRef idx="3">
+              <a:schemeClr val="accent2"/>
+            </a:fillRef>
+            <a:effectRef idx="2">
+              <a:schemeClr val="accent2"/>
+            </a:effectRef>
+            <a:fontRef idx="minor">
+              <a:schemeClr val="lt1"/>
+            </a:fontRef>
+          </p:style>
+          <p:txBody>
+            <a:bodyPr rtlCol="0" anchor="ctr"/>
+            <a:lstStyle/>
+            <a:p>
+              <a:pPr algn="ctr"/>
+              <a:endParaRPr lang="fr-FR"/>
+            </a:p>
+          </p:txBody>
+        </p:sp>
+        <p:sp>
+          <p:nvSpPr>
+            <p:cNvPr id="17" name="Rectangle : coins arrondis 16">
+              <a:extLst>
+                <a:ext uri="{FF2B5EF4-FFF2-40B4-BE49-F238E27FC236}">
+                  <a16:creationId xmlns:a16="http://schemas.microsoft.com/office/drawing/2014/main" id="{4A8E2462-92ED-4D0D-8A9B-6F2A84E74E88}"/>
+                </a:ext>
+              </a:extLst>
+            </p:cNvPr>
+            <p:cNvSpPr/>
+            <p:nvPr/>
+          </p:nvSpPr>
+          <p:spPr>
+            <a:xfrm>
+              <a:off x="4269997" y="4640378"/>
+              <a:ext cx="3087150" cy="1166070"/>
+            </a:xfrm>
+            <a:prstGeom prst="roundRect">
+              <a:avLst/>
+            </a:prstGeom>
+            <a:noFill/>
+            <a:ln w="38100">
+              <a:solidFill>
+                <a:srgbClr val="C00000"/>
+              </a:solidFill>
+            </a:ln>
+          </p:spPr>
+          <p:style>
+            <a:lnRef idx="1">
+              <a:schemeClr val="accent2"/>
+            </a:lnRef>
+            <a:fillRef idx="3">
+              <a:schemeClr val="accent2"/>
+            </a:fillRef>
+            <a:effectRef idx="2">
+              <a:schemeClr val="accent2"/>
+            </a:effectRef>
+            <a:fontRef idx="minor">
+              <a:schemeClr val="lt1"/>
+            </a:fontRef>
+          </p:style>
+          <p:txBody>
+            <a:bodyPr rtlCol="0" anchor="ctr"/>
+            <a:lstStyle/>
+            <a:p>
+              <a:pPr algn="ctr"/>
+              <a:endParaRPr lang="fr-FR"/>
+            </a:p>
+          </p:txBody>
+        </p:sp>
+      </p:grpSp>
     </p:spTree>
     <p:extLst>
       <p:ext uri="{BB962C8B-B14F-4D97-AF65-F5344CB8AC3E}">
-        <p14:creationId xmlns:p14="http://schemas.microsoft.com/office/powerpoint/2010/main" val="39940406"/>
+        <p14:creationId xmlns:p14="http://schemas.microsoft.com/office/powerpoint/2010/main" val="3653649468"/>
       </p:ext>
     </p:extLst>
   </p:cSld>
@@ -5220,7 +5514,75 @@
   <p:timing>
     <p:tnLst>
       <p:par>
-        <p:cTn id="1" dur="indefinite" restart="never" nodeType="tmRoot"/>
+        <p:cTn id="1" dur="indefinite" restart="never" nodeType="tmRoot">
+          <p:childTnLst>
+            <p:seq concurrent="1" nextAc="seek">
+              <p:cTn id="2" dur="indefinite" nodeType="mainSeq">
+                <p:childTnLst>
+                  <p:par>
+                    <p:cTn id="3" fill="hold">
+                      <p:stCondLst>
+                        <p:cond delay="indefinite"/>
+                      </p:stCondLst>
+                      <p:childTnLst>
+                        <p:par>
+                          <p:cTn id="4" fill="hold">
+                            <p:stCondLst>
+                              <p:cond delay="0"/>
+                            </p:stCondLst>
+                            <p:childTnLst>
+                              <p:par>
+                                <p:cTn id="5" presetID="1" presetClass="entr" presetSubtype="0" fill="hold" nodeType="clickEffect">
+                                  <p:stCondLst>
+                                    <p:cond delay="0"/>
+                                  </p:stCondLst>
+                                  <p:childTnLst>
+                                    <p:set>
+                                      <p:cBhvr>
+                                        <p:cTn id="6" dur="1" fill="hold">
+                                          <p:stCondLst>
+                                            <p:cond delay="0"/>
+                                          </p:stCondLst>
+                                        </p:cTn>
+                                        <p:tgtEl>
+                                          <p:spTgt spid="7"/>
+                                        </p:tgtEl>
+                                        <p:attrNameLst>
+                                          <p:attrName>style.visibility</p:attrName>
+                                        </p:attrNameLst>
+                                      </p:cBhvr>
+                                      <p:to>
+                                        <p:strVal val="visible"/>
+                                      </p:to>
+                                    </p:set>
+                                  </p:childTnLst>
+                                </p:cTn>
+                              </p:par>
+                            </p:childTnLst>
+                          </p:cTn>
+                        </p:par>
+                      </p:childTnLst>
+                    </p:cTn>
+                  </p:par>
+                </p:childTnLst>
+              </p:cTn>
+              <p:prevCondLst>
+                <p:cond evt="onPrev" delay="0">
+                  <p:tgtEl>
+                    <p:sldTgt/>
+                  </p:tgtEl>
+                </p:cond>
+              </p:prevCondLst>
+              <p:nextCondLst>
+                <p:cond evt="onNext" delay="0">
+                  <p:tgtEl>
+                    <p:sldTgt/>
+                  </p:tgtEl>
+                </p:cond>
+              </p:nextCondLst>
+            </p:seq>
+          </p:childTnLst>
+        </p:cTn>
       </p:par>
     </p:tnLst>
   </p:timing>
@@ -5256,7 +5618,9 @@
         </p:nvSpPr>
         <p:spPr/>
         <p:txBody>
-          <a:bodyPr/>
+          <a:bodyPr>
+            <a:normAutofit/>
+          </a:bodyPr>
           <a:lstStyle/>
           <a:p>
             <a:r>
@@ -5267,7 +5631,7 @@
               </a:rPr>
               <a:t>Background information - Context of the project</a:t>
             </a:r>
-            <a:endParaRPr lang="fr-FR" sz="2800" b="1" dirty="0">
+            <a:endParaRPr lang="fr-FR" sz="2800" b="1">
               <a:solidFill>
                 <a:schemeClr val="tx1"/>
               </a:solidFill>
@@ -5317,7 +5681,7 @@
           </a:lstStyle>
           <a:p>
             <a:r>
-              <a:rPr lang="fr-FR" sz="2000" b="1" smtClean="0">
+              <a:rPr lang="fr-FR" sz="2000" b="1">
                 <a:solidFill>
                   <a:schemeClr val="tx1"/>
                 </a:solidFill>
@@ -5411,419 +5775,82 @@
           </a:prstGeom>
         </p:spPr>
       </p:pic>
-      <p:sp>
-        <p:nvSpPr>
-          <p:cNvPr id="5" name="Organigramme : Préparation 4"/>
-          <p:cNvSpPr/>
+      <p:pic>
+        <p:nvPicPr>
+          <p:cNvPr id="15" name="Image 14">
+            <a:extLst>
+              <a:ext uri="{FF2B5EF4-FFF2-40B4-BE49-F238E27FC236}">
+                <a16:creationId xmlns:a16="http://schemas.microsoft.com/office/drawing/2014/main" id="{FA8E8004-557F-46D4-9DED-C438ACD76E2A}"/>
+              </a:ext>
+            </a:extLst>
+          </p:cNvPr>
+          <p:cNvPicPr>
+            <a:picLocks noChangeAspect="1"/>
+          </p:cNvPicPr>
           <p:nvPr/>
-        </p:nvSpPr>
+        </p:nvPicPr>
+        <p:blipFill>
+          <a:blip r:embed="rId5">
+            <a:extLst>
+              <a:ext uri="{28A0092B-C50C-407E-A947-70E740481C1C}">
+                <a14:useLocalDpi xmlns:a14="http://schemas.microsoft.com/office/drawing/2010/main" val="0"/>
+              </a:ext>
+            </a:extLst>
+          </a:blip>
+          <a:stretch>
+            <a:fillRect/>
+          </a:stretch>
+        </p:blipFill>
         <p:spPr>
           <a:xfrm>
-            <a:off x="4462272" y="1313301"/>
-            <a:ext cx="2313432" cy="1527048"/>
-          </a:xfrm>
-          <a:prstGeom prst="flowChartPreparation">
+            <a:off x="823721" y="1115468"/>
+            <a:ext cx="10321879" cy="4919572"/>
+          </a:xfrm>
+          <a:prstGeom prst="rect">
             <a:avLst/>
           </a:prstGeom>
         </p:spPr>
-        <p:style>
-          <a:lnRef idx="2">
-            <a:schemeClr val="accent1">
-              <a:shade val="50000"/>
-            </a:schemeClr>
-          </a:lnRef>
-          <a:fillRef idx="1">
-            <a:schemeClr val="accent1"/>
-          </a:fillRef>
-          <a:effectRef idx="0">
-            <a:schemeClr val="accent1"/>
-          </a:effectRef>
-          <a:fontRef idx="minor">
-            <a:schemeClr val="lt1"/>
-          </a:fontRef>
-        </p:style>
-        <p:txBody>
-          <a:bodyPr rtlCol="0" anchor="ctr"/>
-          <a:lstStyle/>
-          <a:p>
-            <a:pPr algn="ctr"/>
-            <a:r>
-              <a:rPr lang="fr-FR" dirty="0" err="1" smtClean="0"/>
-              <a:t>Orphanet</a:t>
-            </a:r>
-            <a:endParaRPr lang="fr-FR" dirty="0" smtClean="0"/>
-          </a:p>
-          <a:p>
-            <a:pPr algn="ctr"/>
-            <a:r>
-              <a:rPr lang="fr-FR" dirty="0" smtClean="0"/>
-              <a:t>SPARQL</a:t>
-            </a:r>
-            <a:endParaRPr lang="fr-FR" dirty="0"/>
-          </a:p>
-        </p:txBody>
-      </p:sp>
-      <p:sp>
-        <p:nvSpPr>
-          <p:cNvPr id="28" name="Organigramme : Préparation 27"/>
-          <p:cNvSpPr/>
+      </p:pic>
+      <p:pic>
+        <p:nvPicPr>
+          <p:cNvPr id="4" name="Image 3">
+            <a:extLst>
+              <a:ext uri="{FF2B5EF4-FFF2-40B4-BE49-F238E27FC236}">
+                <a16:creationId xmlns:a16="http://schemas.microsoft.com/office/drawing/2014/main" id="{EBC991A2-1A6F-4054-A923-34C51286A20D}"/>
+              </a:ext>
+            </a:extLst>
+          </p:cNvPr>
+          <p:cNvPicPr>
+            <a:picLocks noChangeAspect="1"/>
+          </p:cNvPicPr>
           <p:nvPr/>
-        </p:nvSpPr>
+        </p:nvPicPr>
+        <p:blipFill>
+          <a:blip r:embed="rId6">
+            <a:extLst>
+              <a:ext uri="{28A0092B-C50C-407E-A947-70E740481C1C}">
+                <a14:useLocalDpi xmlns:a14="http://schemas.microsoft.com/office/drawing/2010/main" val="0"/>
+              </a:ext>
+            </a:extLst>
+          </a:blip>
+          <a:stretch>
+            <a:fillRect/>
+          </a:stretch>
+        </p:blipFill>
         <p:spPr>
           <a:xfrm>
-            <a:off x="6516624" y="2311473"/>
-            <a:ext cx="2313432" cy="1527048"/>
-          </a:xfrm>
-          <a:prstGeom prst="flowChartPreparation">
+            <a:off x="7044729" y="2189527"/>
+            <a:ext cx="3142849" cy="2181137"/>
+          </a:xfrm>
+          <a:prstGeom prst="rect">
             <a:avLst/>
           </a:prstGeom>
         </p:spPr>
-        <p:style>
-          <a:lnRef idx="2">
-            <a:schemeClr val="accent6"/>
-          </a:lnRef>
-          <a:fillRef idx="1">
-            <a:schemeClr val="lt1"/>
-          </a:fillRef>
-          <a:effectRef idx="0">
-            <a:schemeClr val="accent6"/>
-          </a:effectRef>
-          <a:fontRef idx="minor">
-            <a:schemeClr val="dk1"/>
-          </a:fontRef>
-        </p:style>
-        <p:txBody>
-          <a:bodyPr rtlCol="0" anchor="ctr"/>
-          <a:lstStyle/>
-          <a:p>
-            <a:pPr algn="ctr"/>
-            <a:r>
-              <a:rPr lang="fr-FR" dirty="0" err="1" smtClean="0"/>
-              <a:t>Uniprot</a:t>
-            </a:r>
-            <a:endParaRPr lang="fr-FR" dirty="0" smtClean="0"/>
-          </a:p>
-          <a:p>
-            <a:pPr algn="ctr"/>
-            <a:r>
-              <a:rPr lang="fr-FR" dirty="0" smtClean="0"/>
-              <a:t>SPARQL</a:t>
-            </a:r>
-            <a:endParaRPr lang="fr-FR" dirty="0"/>
-          </a:p>
-        </p:txBody>
-      </p:sp>
-      <p:sp>
-        <p:nvSpPr>
-          <p:cNvPr id="29" name="Organigramme : Préparation 28"/>
-          <p:cNvSpPr/>
-          <p:nvPr/>
-        </p:nvSpPr>
-        <p:spPr>
-          <a:xfrm>
-            <a:off x="8753856" y="1478345"/>
-            <a:ext cx="2313432" cy="1527048"/>
-          </a:xfrm>
-          <a:prstGeom prst="flowChartPreparation">
-            <a:avLst/>
-          </a:prstGeom>
-        </p:spPr>
-        <p:style>
-          <a:lnRef idx="2">
-            <a:schemeClr val="accent6">
-              <a:shade val="50000"/>
-            </a:schemeClr>
-          </a:lnRef>
-          <a:fillRef idx="1">
-            <a:schemeClr val="accent6"/>
-          </a:fillRef>
-          <a:effectRef idx="0">
-            <a:schemeClr val="accent6"/>
-          </a:effectRef>
-          <a:fontRef idx="minor">
-            <a:schemeClr val="lt1"/>
-          </a:fontRef>
-        </p:style>
-        <p:txBody>
-          <a:bodyPr rtlCol="0" anchor="ctr"/>
-          <a:lstStyle/>
-          <a:p>
-            <a:pPr algn="ctr"/>
-            <a:r>
-              <a:rPr lang="fr-FR" dirty="0" err="1" smtClean="0"/>
-              <a:t>Reactome</a:t>
-            </a:r>
-            <a:endParaRPr lang="fr-FR" dirty="0" smtClean="0"/>
-          </a:p>
-          <a:p>
-            <a:pPr algn="ctr"/>
-            <a:r>
-              <a:rPr lang="fr-FR" dirty="0" smtClean="0"/>
-              <a:t>SPARQL</a:t>
-            </a:r>
-            <a:endParaRPr lang="fr-FR" dirty="0"/>
-          </a:p>
-        </p:txBody>
-      </p:sp>
-      <p:sp>
-        <p:nvSpPr>
-          <p:cNvPr id="30" name="Organigramme : Préparation 29"/>
-          <p:cNvSpPr/>
-          <p:nvPr/>
-        </p:nvSpPr>
-        <p:spPr>
-          <a:xfrm>
-            <a:off x="4462272" y="3177742"/>
-            <a:ext cx="2313432" cy="1527048"/>
-          </a:xfrm>
-          <a:prstGeom prst="flowChartPreparation">
-            <a:avLst/>
-          </a:prstGeom>
-        </p:spPr>
-        <p:style>
-          <a:lnRef idx="3">
-            <a:schemeClr val="lt1"/>
-          </a:lnRef>
-          <a:fillRef idx="1">
-            <a:schemeClr val="accent2"/>
-          </a:fillRef>
-          <a:effectRef idx="1">
-            <a:schemeClr val="accent2"/>
-          </a:effectRef>
-          <a:fontRef idx="minor">
-            <a:schemeClr val="lt1"/>
-          </a:fontRef>
-        </p:style>
-        <p:txBody>
-          <a:bodyPr rtlCol="0" anchor="ctr"/>
-          <a:lstStyle/>
-          <a:p>
-            <a:pPr algn="ctr"/>
-            <a:r>
-              <a:rPr lang="fr-FR" dirty="0" err="1" smtClean="0"/>
-              <a:t>wikidata</a:t>
-            </a:r>
-            <a:endParaRPr lang="fr-FR" dirty="0" smtClean="0"/>
-          </a:p>
-          <a:p>
-            <a:pPr algn="ctr"/>
-            <a:r>
-              <a:rPr lang="fr-FR" dirty="0" smtClean="0"/>
-              <a:t>SPARQL</a:t>
-            </a:r>
-            <a:endParaRPr lang="fr-FR" dirty="0"/>
-          </a:p>
-        </p:txBody>
-      </p:sp>
-      <p:sp>
-        <p:nvSpPr>
-          <p:cNvPr id="31" name="Organigramme : Préparation 30"/>
-          <p:cNvSpPr/>
-          <p:nvPr/>
-        </p:nvSpPr>
-        <p:spPr>
-          <a:xfrm>
-            <a:off x="2316480" y="2232034"/>
-            <a:ext cx="2313432" cy="1527048"/>
-          </a:xfrm>
-          <a:prstGeom prst="flowChartPreparation">
-            <a:avLst/>
-          </a:prstGeom>
-        </p:spPr>
-        <p:style>
-          <a:lnRef idx="2">
-            <a:schemeClr val="accent4"/>
-          </a:lnRef>
-          <a:fillRef idx="1">
-            <a:schemeClr val="lt1"/>
-          </a:fillRef>
-          <a:effectRef idx="0">
-            <a:schemeClr val="accent4"/>
-          </a:effectRef>
-          <a:fontRef idx="minor">
-            <a:schemeClr val="dk1"/>
-          </a:fontRef>
-        </p:style>
-        <p:txBody>
-          <a:bodyPr rtlCol="0" anchor="ctr"/>
-          <a:lstStyle/>
-          <a:p>
-            <a:pPr algn="ctr"/>
-            <a:r>
-              <a:rPr lang="fr-FR" dirty="0" err="1" smtClean="0"/>
-              <a:t>wikipathway</a:t>
-            </a:r>
-            <a:endParaRPr lang="fr-FR" dirty="0" smtClean="0"/>
-          </a:p>
-          <a:p>
-            <a:pPr algn="ctr"/>
-            <a:r>
-              <a:rPr lang="fr-FR" dirty="0" smtClean="0"/>
-              <a:t>SPARQL</a:t>
-            </a:r>
-            <a:endParaRPr lang="fr-FR" dirty="0"/>
-          </a:p>
-        </p:txBody>
-      </p:sp>
-      <p:sp>
-        <p:nvSpPr>
-          <p:cNvPr id="32" name="Organigramme : Préparation 31"/>
-          <p:cNvSpPr/>
-          <p:nvPr/>
-        </p:nvSpPr>
-        <p:spPr>
-          <a:xfrm>
-            <a:off x="8403336" y="3596686"/>
-            <a:ext cx="2313432" cy="1527048"/>
-          </a:xfrm>
-          <a:prstGeom prst="flowChartPreparation">
-            <a:avLst/>
-          </a:prstGeom>
-        </p:spPr>
-        <p:style>
-          <a:lnRef idx="3">
-            <a:schemeClr val="lt1"/>
-          </a:lnRef>
-          <a:fillRef idx="1">
-            <a:schemeClr val="accent4"/>
-          </a:fillRef>
-          <a:effectRef idx="1">
-            <a:schemeClr val="accent4"/>
-          </a:effectRef>
-          <a:fontRef idx="minor">
-            <a:schemeClr val="lt1"/>
-          </a:fontRef>
-        </p:style>
-        <p:txBody>
-          <a:bodyPr rtlCol="0" anchor="ctr"/>
-          <a:lstStyle/>
-          <a:p>
-            <a:pPr algn="ctr"/>
-            <a:r>
-              <a:rPr lang="fr-FR" dirty="0" smtClean="0"/>
-              <a:t>EBI</a:t>
-            </a:r>
-          </a:p>
-          <a:p>
-            <a:pPr algn="ctr"/>
-            <a:r>
-              <a:rPr lang="fr-FR" dirty="0" smtClean="0"/>
-              <a:t>SPARQL</a:t>
-            </a:r>
-            <a:endParaRPr lang="fr-FR" dirty="0"/>
-          </a:p>
-        </p:txBody>
-      </p:sp>
-      <p:sp>
-        <p:nvSpPr>
-          <p:cNvPr id="33" name="Organigramme : Préparation 32"/>
-          <p:cNvSpPr/>
-          <p:nvPr/>
-        </p:nvSpPr>
-        <p:spPr>
-          <a:xfrm>
-            <a:off x="1677924" y="4006798"/>
-            <a:ext cx="2313432" cy="1527048"/>
-          </a:xfrm>
-          <a:prstGeom prst="flowChartPreparation">
-            <a:avLst/>
-          </a:prstGeom>
-        </p:spPr>
-        <p:style>
-          <a:lnRef idx="1">
-            <a:schemeClr val="accent2"/>
-          </a:lnRef>
-          <a:fillRef idx="2">
-            <a:schemeClr val="accent2"/>
-          </a:fillRef>
-          <a:effectRef idx="1">
-            <a:schemeClr val="accent2"/>
-          </a:effectRef>
-          <a:fontRef idx="minor">
-            <a:schemeClr val="dk1"/>
-          </a:fontRef>
-        </p:style>
-        <p:txBody>
-          <a:bodyPr rtlCol="0" anchor="ctr"/>
-          <a:lstStyle/>
-          <a:p>
-            <a:pPr algn="ctr"/>
-            <a:r>
-              <a:rPr lang="fr-FR" dirty="0" err="1" smtClean="0"/>
-              <a:t>Disgenet</a:t>
-            </a:r>
-            <a:endParaRPr lang="fr-FR" dirty="0" smtClean="0"/>
-          </a:p>
-          <a:p>
-            <a:pPr algn="ctr"/>
-            <a:r>
-              <a:rPr lang="fr-FR" dirty="0" smtClean="0"/>
-              <a:t>SPARQL</a:t>
-            </a:r>
-            <a:endParaRPr lang="fr-FR" dirty="0"/>
-          </a:p>
-        </p:txBody>
-      </p:sp>
-      <p:sp>
-        <p:nvSpPr>
-          <p:cNvPr id="34" name="Organigramme : Préparation 33"/>
-          <p:cNvSpPr/>
-          <p:nvPr/>
-        </p:nvSpPr>
-        <p:spPr>
-          <a:xfrm>
-            <a:off x="6324600" y="4664427"/>
-            <a:ext cx="2313432" cy="1527048"/>
-          </a:xfrm>
-          <a:prstGeom prst="flowChartPreparation">
-            <a:avLst/>
-          </a:prstGeom>
-          <a:solidFill>
-            <a:srgbClr val="FF0000"/>
-          </a:solidFill>
-        </p:spPr>
-        <p:style>
-          <a:lnRef idx="0">
-            <a:schemeClr val="accent4"/>
-          </a:lnRef>
-          <a:fillRef idx="3">
-            <a:schemeClr val="accent4"/>
-          </a:fillRef>
-          <a:effectRef idx="3">
-            <a:schemeClr val="accent4"/>
-          </a:effectRef>
-          <a:fontRef idx="minor">
-            <a:schemeClr val="lt1"/>
-          </a:fontRef>
-        </p:style>
-        <p:txBody>
-          <a:bodyPr rtlCol="0" anchor="ctr"/>
-          <a:lstStyle/>
-          <a:p>
-            <a:pPr algn="ctr"/>
-            <a:r>
-              <a:rPr lang="fr-FR" dirty="0" err="1" smtClean="0"/>
-              <a:t>Any</a:t>
-            </a:r>
-            <a:r>
-              <a:rPr lang="fr-FR" dirty="0" smtClean="0"/>
-              <a:t> relevant</a:t>
-            </a:r>
-          </a:p>
-          <a:p>
-            <a:pPr algn="ctr"/>
-            <a:r>
-              <a:rPr lang="fr-FR" dirty="0" smtClean="0"/>
-              <a:t>SPARQL</a:t>
-            </a:r>
-            <a:endParaRPr lang="fr-FR" dirty="0"/>
-          </a:p>
-        </p:txBody>
-      </p:sp>
+      </p:pic>
     </p:spTree>
     <p:extLst>
       <p:ext uri="{BB962C8B-B14F-4D97-AF65-F5344CB8AC3E}">
-        <p14:creationId xmlns:p14="http://schemas.microsoft.com/office/powerpoint/2010/main" val="2464201209"/>
+        <p14:creationId xmlns:p14="http://schemas.microsoft.com/office/powerpoint/2010/main" val="39940406"/>
       </p:ext>
     </p:extLst>
   </p:cSld>
@@ -5833,7 +5860,75 @@
   <p:timing>
     <p:tnLst>
       <p:par>
-        <p:cTn id="1" dur="indefinite" restart="never" nodeType="tmRoot"/>
+        <p:cTn id="1" dur="indefinite" restart="never" nodeType="tmRoot">
+          <p:childTnLst>
+            <p:seq concurrent="1" nextAc="seek">
+              <p:cTn id="2" dur="indefinite" nodeType="mainSeq">
+                <p:childTnLst>
+                  <p:par>
+                    <p:cTn id="3" fill="hold">
+                      <p:stCondLst>
+                        <p:cond delay="indefinite"/>
+                      </p:stCondLst>
+                      <p:childTnLst>
+                        <p:par>
+                          <p:cTn id="4" fill="hold">
+                            <p:stCondLst>
+                              <p:cond delay="0"/>
+                            </p:stCondLst>
+                            <p:childTnLst>
+                              <p:par>
+                                <p:cTn id="5" presetID="1" presetClass="entr" presetSubtype="0" fill="hold" nodeType="clickEffect">
+                                  <p:stCondLst>
+                                    <p:cond delay="0"/>
+                                  </p:stCondLst>
+                                  <p:childTnLst>
+                                    <p:set>
+                                      <p:cBhvr>
+                                        <p:cTn id="6" dur="1" fill="hold">
+                                          <p:stCondLst>
+                                            <p:cond delay="0"/>
+                                          </p:stCondLst>
+                                        </p:cTn>
+                                        <p:tgtEl>
+                                          <p:spTgt spid="4"/>
+                                        </p:tgtEl>
+                                        <p:attrNameLst>
+                                          <p:attrName>style.visibility</p:attrName>
+                                        </p:attrNameLst>
+                                      </p:cBhvr>
+                                      <p:to>
+                                        <p:strVal val="visible"/>
+                                      </p:to>
+                                    </p:set>
+                                  </p:childTnLst>
+                                </p:cTn>
+                              </p:par>
+                            </p:childTnLst>
+                          </p:cTn>
+                        </p:par>
+                      </p:childTnLst>
+                    </p:cTn>
+                  </p:par>
+                </p:childTnLst>
+              </p:cTn>
+              <p:prevCondLst>
+                <p:cond evt="onPrev" delay="0">
+                  <p:tgtEl>
+                    <p:sldTgt/>
+                  </p:tgtEl>
+                </p:cond>
+              </p:prevCondLst>
+              <p:nextCondLst>
+                <p:cond evt="onNext" delay="0">
+                  <p:tgtEl>
+                    <p:sldTgt/>
+                  </p:tgtEl>
+                </p:cond>
+              </p:nextCondLst>
+            </p:seq>
+          </p:childTnLst>
+        </p:cTn>
       </p:par>
     </p:tnLst>
   </p:timing>
@@ -5873,20 +5968,12 @@
           <a:lstStyle/>
           <a:p>
             <a:r>
-              <a:rPr lang="en-US" sz="2800" b="1" dirty="0">
+              <a:rPr lang="en-US" sz="2800" b="1">
                 <a:solidFill>
                   <a:schemeClr val="tx1"/>
                 </a:solidFill>
               </a:rPr>
-              <a:t>Expected </a:t>
-            </a:r>
-            <a:r>
-              <a:rPr lang="en-US" sz="2800" b="1" dirty="0" smtClean="0">
-                <a:solidFill>
-                  <a:schemeClr val="tx1"/>
-                </a:solidFill>
-              </a:rPr>
-              <a:t>Outcomes : Solving puzzle Federation !</a:t>
+              <a:t>Background information - Context of the project</a:t>
             </a:r>
             <a:endParaRPr lang="fr-FR" sz="2800" b="1" dirty="0">
               <a:solidFill>
@@ -5938,7 +6025,7 @@
           </a:lstStyle>
           <a:p>
             <a:r>
-              <a:rPr lang="fr-FR" sz="2000" b="1" smtClean="0">
+              <a:rPr lang="fr-FR" sz="2000" b="1">
                 <a:solidFill>
                   <a:schemeClr val="tx1"/>
                 </a:solidFill>
@@ -6069,18 +6156,17 @@
           <a:p>
             <a:pPr algn="ctr"/>
             <a:r>
-              <a:rPr lang="fr-FR" dirty="0" err="1" smtClean="0"/>
+              <a:rPr lang="fr-FR" dirty="0" err="1"/>
               <a:t>Orphanet</a:t>
             </a:r>
-            <a:endParaRPr lang="fr-FR" dirty="0" smtClean="0"/>
+            <a:endParaRPr lang="fr-FR" dirty="0"/>
           </a:p>
           <a:p>
             <a:pPr algn="ctr"/>
             <a:r>
-              <a:rPr lang="fr-FR" dirty="0" smtClean="0"/>
+              <a:rPr lang="fr-FR" dirty="0"/>
               <a:t>SPARQL</a:t>
             </a:r>
-            <a:endParaRPr lang="fr-FR" dirty="0"/>
           </a:p>
         </p:txBody>
       </p:sp>
@@ -6092,7 +6178,7 @@
         </p:nvSpPr>
         <p:spPr>
           <a:xfrm>
-            <a:off x="6324600" y="2101161"/>
+            <a:off x="6516624" y="2311473"/>
             <a:ext cx="2313432" cy="1527048"/>
           </a:xfrm>
           <a:prstGeom prst="flowChartPreparation">
@@ -6119,18 +6205,17 @@
           <a:p>
             <a:pPr algn="ctr"/>
             <a:r>
-              <a:rPr lang="fr-FR" dirty="0" err="1" smtClean="0"/>
+              <a:rPr lang="fr-FR" dirty="0" err="1"/>
               <a:t>Uniprot</a:t>
             </a:r>
-            <a:endParaRPr lang="fr-FR" dirty="0" smtClean="0"/>
+            <a:endParaRPr lang="fr-FR" dirty="0"/>
           </a:p>
           <a:p>
             <a:pPr algn="ctr"/>
             <a:r>
-              <a:rPr lang="fr-FR" dirty="0" smtClean="0"/>
+              <a:rPr lang="fr-FR" dirty="0"/>
               <a:t>SPARQL</a:t>
             </a:r>
-            <a:endParaRPr lang="fr-FR" dirty="0"/>
           </a:p>
         </p:txBody>
       </p:sp>
@@ -6142,7 +6227,7 @@
         </p:nvSpPr>
         <p:spPr>
           <a:xfrm>
-            <a:off x="8101584" y="2839414"/>
+            <a:off x="8753856" y="1478345"/>
             <a:ext cx="2313432" cy="1527048"/>
           </a:xfrm>
           <a:prstGeom prst="flowChartPreparation">
@@ -6171,18 +6256,17 @@
           <a:p>
             <a:pPr algn="ctr"/>
             <a:r>
-              <a:rPr lang="fr-FR" dirty="0" err="1" smtClean="0"/>
+              <a:rPr lang="fr-FR" dirty="0" err="1"/>
               <a:t>Reactome</a:t>
             </a:r>
-            <a:endParaRPr lang="fr-FR" dirty="0" smtClean="0"/>
+            <a:endParaRPr lang="fr-FR" dirty="0"/>
           </a:p>
           <a:p>
             <a:pPr algn="ctr"/>
             <a:r>
-              <a:rPr lang="fr-FR" dirty="0" smtClean="0"/>
+              <a:rPr lang="fr-FR" dirty="0"/>
               <a:t>SPARQL</a:t>
             </a:r>
-            <a:endParaRPr lang="fr-FR" dirty="0"/>
           </a:p>
         </p:txBody>
       </p:sp>
@@ -6194,7 +6278,7 @@
         </p:nvSpPr>
         <p:spPr>
           <a:xfrm>
-            <a:off x="4462272" y="2839414"/>
+            <a:off x="4462272" y="3177742"/>
             <a:ext cx="2313432" cy="1527048"/>
           </a:xfrm>
           <a:prstGeom prst="flowChartPreparation">
@@ -6221,18 +6305,17 @@
           <a:p>
             <a:pPr algn="ctr"/>
             <a:r>
-              <a:rPr lang="fr-FR" dirty="0" err="1" smtClean="0"/>
+              <a:rPr lang="fr-FR" dirty="0" err="1"/>
               <a:t>wikidata</a:t>
             </a:r>
-            <a:endParaRPr lang="fr-FR" dirty="0" smtClean="0"/>
+            <a:endParaRPr lang="fr-FR" dirty="0"/>
           </a:p>
           <a:p>
             <a:pPr algn="ctr"/>
             <a:r>
-              <a:rPr lang="fr-FR" dirty="0" smtClean="0"/>
+              <a:rPr lang="fr-FR" dirty="0"/>
               <a:t>SPARQL</a:t>
             </a:r>
-            <a:endParaRPr lang="fr-FR" dirty="0"/>
           </a:p>
         </p:txBody>
       </p:sp>
@@ -6244,7 +6327,7 @@
         </p:nvSpPr>
         <p:spPr>
           <a:xfrm>
-            <a:off x="2627376" y="2113162"/>
+            <a:off x="2316480" y="2232034"/>
             <a:ext cx="2313432" cy="1527048"/>
           </a:xfrm>
           <a:prstGeom prst="flowChartPreparation">
@@ -6271,18 +6354,17 @@
           <a:p>
             <a:pPr algn="ctr"/>
             <a:r>
-              <a:rPr lang="fr-FR" dirty="0" err="1" smtClean="0"/>
+              <a:rPr lang="fr-FR" dirty="0" err="1"/>
               <a:t>wikipathway</a:t>
             </a:r>
-            <a:endParaRPr lang="fr-FR" dirty="0" smtClean="0"/>
+            <a:endParaRPr lang="fr-FR" dirty="0"/>
           </a:p>
           <a:p>
             <a:pPr algn="ctr"/>
             <a:r>
-              <a:rPr lang="fr-FR" dirty="0" smtClean="0"/>
+              <a:rPr lang="fr-FR" dirty="0"/>
               <a:t>SPARQL</a:t>
             </a:r>
-            <a:endParaRPr lang="fr-FR" dirty="0"/>
           </a:p>
         </p:txBody>
       </p:sp>
@@ -6294,7 +6376,7 @@
         </p:nvSpPr>
         <p:spPr>
           <a:xfrm>
-            <a:off x="6281928" y="3596686"/>
+            <a:off x="8403336" y="3596686"/>
             <a:ext cx="2313432" cy="1527048"/>
           </a:xfrm>
           <a:prstGeom prst="flowChartPreparation">
@@ -6321,17 +6403,16 @@
           <a:p>
             <a:pPr algn="ctr"/>
             <a:r>
-              <a:rPr lang="fr-FR" dirty="0" smtClean="0"/>
+              <a:rPr lang="fr-FR" dirty="0"/>
               <a:t>EBI</a:t>
             </a:r>
           </a:p>
           <a:p>
             <a:pPr algn="ctr"/>
             <a:r>
-              <a:rPr lang="fr-FR" dirty="0" smtClean="0"/>
+              <a:rPr lang="fr-FR" dirty="0"/>
               <a:t>SPARQL</a:t>
             </a:r>
-            <a:endParaRPr lang="fr-FR" dirty="0"/>
           </a:p>
         </p:txBody>
       </p:sp>
@@ -6343,7 +6424,7 @@
         </p:nvSpPr>
         <p:spPr>
           <a:xfrm>
-            <a:off x="2638044" y="3659326"/>
+            <a:off x="1677924" y="4006798"/>
             <a:ext cx="2313432" cy="1527048"/>
           </a:xfrm>
           <a:prstGeom prst="flowChartPreparation">
@@ -6370,18 +6451,17 @@
           <a:p>
             <a:pPr algn="ctr"/>
             <a:r>
-              <a:rPr lang="fr-FR" dirty="0" err="1" smtClean="0"/>
+              <a:rPr lang="fr-FR" dirty="0" err="1"/>
               <a:t>Disgenet</a:t>
             </a:r>
-            <a:endParaRPr lang="fr-FR" dirty="0" smtClean="0"/>
+            <a:endParaRPr lang="fr-FR" dirty="0"/>
           </a:p>
           <a:p>
             <a:pPr algn="ctr"/>
             <a:r>
-              <a:rPr lang="fr-FR" dirty="0" smtClean="0"/>
+              <a:rPr lang="fr-FR" dirty="0"/>
               <a:t>SPARQL</a:t>
             </a:r>
-            <a:endParaRPr lang="fr-FR" dirty="0"/>
           </a:p>
         </p:txBody>
       </p:sp>
@@ -6393,7 +6473,7 @@
         </p:nvSpPr>
         <p:spPr>
           <a:xfrm>
-            <a:off x="4514088" y="4371819"/>
+            <a:off x="6324600" y="4664427"/>
             <a:ext cx="2313432" cy="1527048"/>
           </a:xfrm>
           <a:prstGeom prst="flowChartPreparation">
@@ -6423,41 +6503,33 @@
           <a:p>
             <a:pPr algn="ctr"/>
             <a:r>
-              <a:rPr lang="fr-FR" dirty="0" err="1" smtClean="0"/>
+              <a:rPr lang="fr-FR" dirty="0" err="1"/>
               <a:t>Any</a:t>
             </a:r>
             <a:r>
-              <a:rPr lang="fr-FR" dirty="0" smtClean="0"/>
+              <a:rPr lang="fr-FR" dirty="0"/>
               <a:t> relevant</a:t>
             </a:r>
           </a:p>
           <a:p>
             <a:pPr algn="ctr"/>
             <a:r>
-              <a:rPr lang="fr-FR" dirty="0" smtClean="0"/>
+              <a:rPr lang="fr-FR" dirty="0"/>
               <a:t>SPARQL</a:t>
             </a:r>
-            <a:endParaRPr lang="fr-FR" dirty="0"/>
           </a:p>
         </p:txBody>
       </p:sp>
     </p:spTree>
     <p:extLst>
       <p:ext uri="{BB962C8B-B14F-4D97-AF65-F5344CB8AC3E}">
-        <p14:creationId xmlns:p14="http://schemas.microsoft.com/office/powerpoint/2010/main" val="3044071758"/>
+        <p14:creationId xmlns:p14="http://schemas.microsoft.com/office/powerpoint/2010/main" val="2464201209"/>
       </p:ext>
     </p:extLst>
   </p:cSld>
   <p:clrMapOvr>
     <a:masterClrMapping/>
   </p:clrMapOvr>
-  <p:timing>
-    <p:tnLst>
-      <p:par>
-        <p:cTn id="1" dur="indefinite" restart="never" nodeType="tmRoot"/>
-      </p:par>
-    </p:tnLst>
-  </p:timing>
 </p:sld>
 </file>
 
@@ -6494,12 +6566,12 @@
           <a:lstStyle/>
           <a:p>
             <a:r>
-              <a:rPr lang="en-US" sz="2800" b="1" dirty="0" smtClean="0">
+              <a:rPr lang="en-US" sz="2800" b="1" dirty="0">
                 <a:solidFill>
                   <a:schemeClr val="tx1"/>
                 </a:solidFill>
               </a:rPr>
-              <a:t>Expected Outcomes</a:t>
+              <a:t>Expected Outcomes : Solving puzzle Federation !</a:t>
             </a:r>
             <a:endParaRPr lang="fr-FR" sz="2800" b="1" dirty="0">
               <a:solidFill>
@@ -6551,7 +6623,7 @@
           </a:lstStyle>
           <a:p>
             <a:r>
-              <a:rPr lang="fr-FR" sz="2000" b="1" smtClean="0">
+              <a:rPr lang="fr-FR" sz="2000" b="1">
                 <a:solidFill>
                   <a:schemeClr val="tx1"/>
                 </a:solidFill>
@@ -6647,188 +6719,415 @@
       </p:pic>
       <p:sp>
         <p:nvSpPr>
-          <p:cNvPr id="3" name="ZoneTexte 2"/>
-          <p:cNvSpPr txBox="1"/>
+          <p:cNvPr id="5" name="Organigramme : Préparation 4"/>
+          <p:cNvSpPr/>
           <p:nvPr/>
         </p:nvSpPr>
         <p:spPr>
           <a:xfrm>
-            <a:off x="939337" y="1737360"/>
-            <a:ext cx="10507288" cy="5262979"/>
-          </a:xfrm>
-          <a:prstGeom prst="rect">
+            <a:off x="4462272" y="1313301"/>
+            <a:ext cx="2313432" cy="1527048"/>
+          </a:xfrm>
+          <a:prstGeom prst="flowChartPreparation">
             <a:avLst/>
           </a:prstGeom>
-          <a:noFill/>
-        </p:spPr>
-        <p:txBody>
-          <a:bodyPr wrap="square" rtlCol="0">
-            <a:spAutoFit/>
-          </a:bodyPr>
-          <a:lstStyle/>
-          <a:p>
-            <a:r>
-              <a:rPr lang="en-US" sz="2400" dirty="0" smtClean="0"/>
-              <a:t>We propose to try to:</a:t>
-            </a:r>
-          </a:p>
-          <a:p>
-            <a:endParaRPr lang="fr-FR" sz="2400" dirty="0"/>
-          </a:p>
-          <a:p>
-            <a:pPr marL="285750" indent="-285750">
-              <a:buFont typeface="Arial" panose="020B0604020202020204" pitchFamily="34" charset="0"/>
-              <a:buChar char="•"/>
-            </a:pPr>
-            <a:r>
-              <a:rPr lang="en-US" sz="2400" dirty="0" smtClean="0"/>
-              <a:t>Obtain an (editable) catalogue of relevant </a:t>
-            </a:r>
-            <a:r>
-              <a:rPr lang="en-US" sz="2400" dirty="0" err="1" smtClean="0"/>
-              <a:t>sparql</a:t>
-            </a:r>
-            <a:r>
-              <a:rPr lang="en-US" sz="2400" dirty="0" smtClean="0"/>
-              <a:t> Endpoint </a:t>
-            </a:r>
-            <a:r>
-              <a:rPr lang="en-US" sz="2400" dirty="0" smtClean="0"/>
-              <a:t>in the field of RD</a:t>
-            </a:r>
-            <a:r>
-              <a:rPr lang="en-US" sz="2400" dirty="0" smtClean="0"/>
-              <a:t>.</a:t>
-            </a:r>
-          </a:p>
-          <a:p>
-            <a:pPr marL="1257300" lvl="2" indent="-342900">
-              <a:buFont typeface="Wingdings" panose="05000000000000000000" pitchFamily="2" charset="2"/>
-              <a:buChar char="Ø"/>
-            </a:pPr>
-            <a:r>
-              <a:rPr lang="en-US" sz="2400" dirty="0" err="1" smtClean="0"/>
-              <a:t>Biotools</a:t>
-            </a:r>
-            <a:r>
-              <a:rPr lang="en-US" sz="2400" dirty="0" smtClean="0"/>
-              <a:t> =&gt; “</a:t>
-            </a:r>
-            <a:r>
-              <a:rPr lang="en-US" sz="2400" dirty="0" err="1" smtClean="0"/>
-              <a:t>sparql</a:t>
-            </a:r>
-            <a:r>
-              <a:rPr lang="en-US" sz="2400" dirty="0" smtClean="0"/>
-              <a:t>”, “endpoint”, “rare diseases”</a:t>
-            </a:r>
-            <a:endParaRPr lang="en-US" sz="2400" dirty="0" smtClean="0"/>
-          </a:p>
-          <a:p>
-            <a:endParaRPr lang="en-US" sz="2400" dirty="0" smtClean="0"/>
-          </a:p>
-          <a:p>
-            <a:pPr marL="285750" indent="-285750">
-              <a:buFont typeface="Arial" panose="020B0604020202020204" pitchFamily="34" charset="0"/>
-              <a:buChar char="•"/>
-            </a:pPr>
-            <a:r>
-              <a:rPr lang="en-US" sz="2400" dirty="0" smtClean="0"/>
-              <a:t>Provide (or list existing) </a:t>
-            </a:r>
-            <a:r>
-              <a:rPr lang="en-US" sz="2400" dirty="0" err="1" smtClean="0"/>
-              <a:t>sparql</a:t>
-            </a:r>
-            <a:r>
-              <a:rPr lang="en-US" sz="2400" dirty="0" smtClean="0"/>
-              <a:t> queries for each sources, relevant for </a:t>
-            </a:r>
-            <a:r>
-              <a:rPr lang="en-US" sz="2400" dirty="0" smtClean="0"/>
-              <a:t>RD</a:t>
-            </a:r>
-          </a:p>
-          <a:p>
-            <a:pPr marL="742950" lvl="1" indent="-285750">
-              <a:buFont typeface="Arial" panose="020B0604020202020204" pitchFamily="34" charset="0"/>
-              <a:buChar char="•"/>
-            </a:pPr>
-            <a:endParaRPr lang="en-US" sz="2400" dirty="0" smtClean="0"/>
-          </a:p>
-          <a:p>
-            <a:endParaRPr lang="en-US" sz="2400" dirty="0" smtClean="0"/>
-          </a:p>
-          <a:p>
-            <a:pPr marL="285750" indent="-285750">
-              <a:buFont typeface="Arial" panose="020B0604020202020204" pitchFamily="34" charset="0"/>
-              <a:buChar char="•"/>
-            </a:pPr>
-            <a:r>
-              <a:rPr lang="en-US" sz="2400" dirty="0" smtClean="0"/>
-              <a:t>Give access to federated </a:t>
-            </a:r>
-            <a:r>
-              <a:rPr lang="en-US" sz="2400" dirty="0" err="1" smtClean="0"/>
-              <a:t>sparql</a:t>
-            </a:r>
-            <a:r>
-              <a:rPr lang="en-US" sz="2400" dirty="0" smtClean="0"/>
-              <a:t> queries across sources with example</a:t>
-            </a:r>
-          </a:p>
-          <a:p>
-            <a:pPr marL="285750" indent="-285750">
-              <a:buFont typeface="Arial" panose="020B0604020202020204" pitchFamily="34" charset="0"/>
-              <a:buChar char="•"/>
-            </a:pPr>
-            <a:endParaRPr lang="en-US" sz="2400" dirty="0"/>
-          </a:p>
-          <a:p>
-            <a:pPr marL="285750" indent="-285750">
-              <a:buFont typeface="Arial" panose="020B0604020202020204" pitchFamily="34" charset="0"/>
-              <a:buChar char="•"/>
-            </a:pPr>
-            <a:r>
-              <a:rPr lang="en-US" sz="2400" dirty="0" smtClean="0"/>
-              <a:t>Provide nice web interface to end-users</a:t>
-            </a:r>
-          </a:p>
-          <a:p>
-            <a:pPr marL="285750" indent="-285750">
-              <a:buFont typeface="Arial" panose="020B0604020202020204" pitchFamily="34" charset="0"/>
-              <a:buChar char="•"/>
-            </a:pPr>
-            <a:r>
-              <a:rPr lang="en-US" sz="2400" dirty="0" smtClean="0"/>
-              <a:t>Enjoy!</a:t>
-            </a:r>
-          </a:p>
-          <a:p>
-            <a:endParaRPr lang="fr-FR" sz="2400" dirty="0" smtClean="0"/>
-          </a:p>
-          <a:p>
-            <a:endParaRPr lang="fr-FR" sz="2400" dirty="0"/>
+        </p:spPr>
+        <p:style>
+          <a:lnRef idx="2">
+            <a:schemeClr val="accent1">
+              <a:shade val="50000"/>
+            </a:schemeClr>
+          </a:lnRef>
+          <a:fillRef idx="1">
+            <a:schemeClr val="accent1"/>
+          </a:fillRef>
+          <a:effectRef idx="0">
+            <a:schemeClr val="accent1"/>
+          </a:effectRef>
+          <a:fontRef idx="minor">
+            <a:schemeClr val="lt1"/>
+          </a:fontRef>
+        </p:style>
+        <p:txBody>
+          <a:bodyPr rtlCol="0" anchor="ctr"/>
+          <a:lstStyle/>
+          <a:p>
+            <a:pPr algn="ctr"/>
+            <a:r>
+              <a:rPr lang="fr-FR" dirty="0" err="1"/>
+              <a:t>Orphanet</a:t>
+            </a:r>
+            <a:endParaRPr lang="fr-FR" dirty="0"/>
+          </a:p>
+          <a:p>
+            <a:pPr algn="ctr"/>
+            <a:r>
+              <a:rPr lang="fr-FR" dirty="0"/>
+              <a:t>SPARQL</a:t>
+            </a:r>
+          </a:p>
+        </p:txBody>
+      </p:sp>
+      <p:sp>
+        <p:nvSpPr>
+          <p:cNvPr id="28" name="Organigramme : Préparation 27"/>
+          <p:cNvSpPr/>
+          <p:nvPr/>
+        </p:nvSpPr>
+        <p:spPr>
+          <a:xfrm>
+            <a:off x="6324600" y="2101161"/>
+            <a:ext cx="2313432" cy="1527048"/>
+          </a:xfrm>
+          <a:prstGeom prst="flowChartPreparation">
+            <a:avLst/>
+          </a:prstGeom>
+        </p:spPr>
+        <p:style>
+          <a:lnRef idx="2">
+            <a:schemeClr val="accent6"/>
+          </a:lnRef>
+          <a:fillRef idx="1">
+            <a:schemeClr val="lt1"/>
+          </a:fillRef>
+          <a:effectRef idx="0">
+            <a:schemeClr val="accent6"/>
+          </a:effectRef>
+          <a:fontRef idx="minor">
+            <a:schemeClr val="dk1"/>
+          </a:fontRef>
+        </p:style>
+        <p:txBody>
+          <a:bodyPr rtlCol="0" anchor="ctr"/>
+          <a:lstStyle/>
+          <a:p>
+            <a:pPr algn="ctr"/>
+            <a:r>
+              <a:rPr lang="fr-FR" dirty="0" err="1"/>
+              <a:t>Uniprot</a:t>
+            </a:r>
+            <a:endParaRPr lang="fr-FR" dirty="0"/>
+          </a:p>
+          <a:p>
+            <a:pPr algn="ctr"/>
+            <a:r>
+              <a:rPr lang="fr-FR" dirty="0"/>
+              <a:t>SPARQL</a:t>
+            </a:r>
+          </a:p>
+        </p:txBody>
+      </p:sp>
+      <p:sp>
+        <p:nvSpPr>
+          <p:cNvPr id="29" name="Organigramme : Préparation 28"/>
+          <p:cNvSpPr/>
+          <p:nvPr/>
+        </p:nvSpPr>
+        <p:spPr>
+          <a:xfrm>
+            <a:off x="8101584" y="2839414"/>
+            <a:ext cx="2313432" cy="1527048"/>
+          </a:xfrm>
+          <a:prstGeom prst="flowChartPreparation">
+            <a:avLst/>
+          </a:prstGeom>
+        </p:spPr>
+        <p:style>
+          <a:lnRef idx="2">
+            <a:schemeClr val="accent6">
+              <a:shade val="50000"/>
+            </a:schemeClr>
+          </a:lnRef>
+          <a:fillRef idx="1">
+            <a:schemeClr val="accent6"/>
+          </a:fillRef>
+          <a:effectRef idx="0">
+            <a:schemeClr val="accent6"/>
+          </a:effectRef>
+          <a:fontRef idx="minor">
+            <a:schemeClr val="lt1"/>
+          </a:fontRef>
+        </p:style>
+        <p:txBody>
+          <a:bodyPr rtlCol="0" anchor="ctr"/>
+          <a:lstStyle/>
+          <a:p>
+            <a:pPr algn="ctr"/>
+            <a:r>
+              <a:rPr lang="fr-FR" dirty="0" err="1"/>
+              <a:t>Reactome</a:t>
+            </a:r>
+            <a:endParaRPr lang="fr-FR" dirty="0"/>
+          </a:p>
+          <a:p>
+            <a:pPr algn="ctr"/>
+            <a:r>
+              <a:rPr lang="fr-FR" dirty="0"/>
+              <a:t>SPARQL</a:t>
+            </a:r>
+          </a:p>
+        </p:txBody>
+      </p:sp>
+      <p:sp>
+        <p:nvSpPr>
+          <p:cNvPr id="30" name="Organigramme : Préparation 29"/>
+          <p:cNvSpPr/>
+          <p:nvPr/>
+        </p:nvSpPr>
+        <p:spPr>
+          <a:xfrm>
+            <a:off x="4462272" y="2839414"/>
+            <a:ext cx="2313432" cy="1527048"/>
+          </a:xfrm>
+          <a:prstGeom prst="flowChartPreparation">
+            <a:avLst/>
+          </a:prstGeom>
+        </p:spPr>
+        <p:style>
+          <a:lnRef idx="3">
+            <a:schemeClr val="lt1"/>
+          </a:lnRef>
+          <a:fillRef idx="1">
+            <a:schemeClr val="accent2"/>
+          </a:fillRef>
+          <a:effectRef idx="1">
+            <a:schemeClr val="accent2"/>
+          </a:effectRef>
+          <a:fontRef idx="minor">
+            <a:schemeClr val="lt1"/>
+          </a:fontRef>
+        </p:style>
+        <p:txBody>
+          <a:bodyPr rtlCol="0" anchor="ctr"/>
+          <a:lstStyle/>
+          <a:p>
+            <a:pPr algn="ctr"/>
+            <a:r>
+              <a:rPr lang="fr-FR" dirty="0" err="1"/>
+              <a:t>wikidata</a:t>
+            </a:r>
+            <a:endParaRPr lang="fr-FR" dirty="0"/>
+          </a:p>
+          <a:p>
+            <a:pPr algn="ctr"/>
+            <a:r>
+              <a:rPr lang="fr-FR" dirty="0"/>
+              <a:t>SPARQL</a:t>
+            </a:r>
+          </a:p>
+        </p:txBody>
+      </p:sp>
+      <p:sp>
+        <p:nvSpPr>
+          <p:cNvPr id="31" name="Organigramme : Préparation 30"/>
+          <p:cNvSpPr/>
+          <p:nvPr/>
+        </p:nvSpPr>
+        <p:spPr>
+          <a:xfrm>
+            <a:off x="2627376" y="2113162"/>
+            <a:ext cx="2313432" cy="1527048"/>
+          </a:xfrm>
+          <a:prstGeom prst="flowChartPreparation">
+            <a:avLst/>
+          </a:prstGeom>
+        </p:spPr>
+        <p:style>
+          <a:lnRef idx="2">
+            <a:schemeClr val="accent4"/>
+          </a:lnRef>
+          <a:fillRef idx="1">
+            <a:schemeClr val="lt1"/>
+          </a:fillRef>
+          <a:effectRef idx="0">
+            <a:schemeClr val="accent4"/>
+          </a:effectRef>
+          <a:fontRef idx="minor">
+            <a:schemeClr val="dk1"/>
+          </a:fontRef>
+        </p:style>
+        <p:txBody>
+          <a:bodyPr rtlCol="0" anchor="ctr"/>
+          <a:lstStyle/>
+          <a:p>
+            <a:pPr algn="ctr"/>
+            <a:r>
+              <a:rPr lang="fr-FR" dirty="0" err="1"/>
+              <a:t>wikipathway</a:t>
+            </a:r>
+            <a:endParaRPr lang="fr-FR" dirty="0"/>
+          </a:p>
+          <a:p>
+            <a:pPr algn="ctr"/>
+            <a:r>
+              <a:rPr lang="fr-FR" dirty="0"/>
+              <a:t>SPARQL</a:t>
+            </a:r>
+          </a:p>
+        </p:txBody>
+      </p:sp>
+      <p:sp>
+        <p:nvSpPr>
+          <p:cNvPr id="32" name="Organigramme : Préparation 31"/>
+          <p:cNvSpPr/>
+          <p:nvPr/>
+        </p:nvSpPr>
+        <p:spPr>
+          <a:xfrm>
+            <a:off x="6281928" y="3596686"/>
+            <a:ext cx="2313432" cy="1527048"/>
+          </a:xfrm>
+          <a:prstGeom prst="flowChartPreparation">
+            <a:avLst/>
+          </a:prstGeom>
+        </p:spPr>
+        <p:style>
+          <a:lnRef idx="3">
+            <a:schemeClr val="lt1"/>
+          </a:lnRef>
+          <a:fillRef idx="1">
+            <a:schemeClr val="accent4"/>
+          </a:fillRef>
+          <a:effectRef idx="1">
+            <a:schemeClr val="accent4"/>
+          </a:effectRef>
+          <a:fontRef idx="minor">
+            <a:schemeClr val="lt1"/>
+          </a:fontRef>
+        </p:style>
+        <p:txBody>
+          <a:bodyPr rtlCol="0" anchor="ctr"/>
+          <a:lstStyle/>
+          <a:p>
+            <a:pPr algn="ctr"/>
+            <a:r>
+              <a:rPr lang="fr-FR" dirty="0"/>
+              <a:t>EBI</a:t>
+            </a:r>
+          </a:p>
+          <a:p>
+            <a:pPr algn="ctr"/>
+            <a:r>
+              <a:rPr lang="fr-FR" dirty="0"/>
+              <a:t>SPARQL</a:t>
+            </a:r>
+          </a:p>
+        </p:txBody>
+      </p:sp>
+      <p:sp>
+        <p:nvSpPr>
+          <p:cNvPr id="33" name="Organigramme : Préparation 32"/>
+          <p:cNvSpPr/>
+          <p:nvPr/>
+        </p:nvSpPr>
+        <p:spPr>
+          <a:xfrm>
+            <a:off x="2638044" y="3659326"/>
+            <a:ext cx="2313432" cy="1527048"/>
+          </a:xfrm>
+          <a:prstGeom prst="flowChartPreparation">
+            <a:avLst/>
+          </a:prstGeom>
+        </p:spPr>
+        <p:style>
+          <a:lnRef idx="1">
+            <a:schemeClr val="accent2"/>
+          </a:lnRef>
+          <a:fillRef idx="2">
+            <a:schemeClr val="accent2"/>
+          </a:fillRef>
+          <a:effectRef idx="1">
+            <a:schemeClr val="accent2"/>
+          </a:effectRef>
+          <a:fontRef idx="minor">
+            <a:schemeClr val="dk1"/>
+          </a:fontRef>
+        </p:style>
+        <p:txBody>
+          <a:bodyPr rtlCol="0" anchor="ctr"/>
+          <a:lstStyle/>
+          <a:p>
+            <a:pPr algn="ctr"/>
+            <a:r>
+              <a:rPr lang="fr-FR" dirty="0" err="1"/>
+              <a:t>Disgenet</a:t>
+            </a:r>
+            <a:endParaRPr lang="fr-FR" dirty="0"/>
+          </a:p>
+          <a:p>
+            <a:pPr algn="ctr"/>
+            <a:r>
+              <a:rPr lang="fr-FR" dirty="0"/>
+              <a:t>SPARQL</a:t>
+            </a:r>
+          </a:p>
+        </p:txBody>
+      </p:sp>
+      <p:sp>
+        <p:nvSpPr>
+          <p:cNvPr id="34" name="Organigramme : Préparation 33"/>
+          <p:cNvSpPr/>
+          <p:nvPr/>
+        </p:nvSpPr>
+        <p:spPr>
+          <a:xfrm>
+            <a:off x="4514088" y="4371819"/>
+            <a:ext cx="2313432" cy="1527048"/>
+          </a:xfrm>
+          <a:prstGeom prst="flowChartPreparation">
+            <a:avLst/>
+          </a:prstGeom>
+          <a:solidFill>
+            <a:srgbClr val="FF0000"/>
+          </a:solidFill>
+        </p:spPr>
+        <p:style>
+          <a:lnRef idx="0">
+            <a:schemeClr val="accent4"/>
+          </a:lnRef>
+          <a:fillRef idx="3">
+            <a:schemeClr val="accent4"/>
+          </a:fillRef>
+          <a:effectRef idx="3">
+            <a:schemeClr val="accent4"/>
+          </a:effectRef>
+          <a:fontRef idx="minor">
+            <a:schemeClr val="lt1"/>
+          </a:fontRef>
+        </p:style>
+        <p:txBody>
+          <a:bodyPr rtlCol="0" anchor="ctr"/>
+          <a:lstStyle/>
+          <a:p>
+            <a:pPr algn="ctr"/>
+            <a:r>
+              <a:rPr lang="fr-FR" dirty="0" err="1"/>
+              <a:t>Any</a:t>
+            </a:r>
+            <a:r>
+              <a:rPr lang="fr-FR" dirty="0"/>
+              <a:t> relevant</a:t>
+            </a:r>
+          </a:p>
+          <a:p>
+            <a:pPr algn="ctr"/>
+            <a:r>
+              <a:rPr lang="fr-FR" dirty="0"/>
+              <a:t>SPARQL</a:t>
+            </a:r>
           </a:p>
         </p:txBody>
       </p:sp>
     </p:spTree>
     <p:extLst>
       <p:ext uri="{BB962C8B-B14F-4D97-AF65-F5344CB8AC3E}">
-        <p14:creationId xmlns:p14="http://schemas.microsoft.com/office/powerpoint/2010/main" val="4255653707"/>
+        <p14:creationId xmlns:p14="http://schemas.microsoft.com/office/powerpoint/2010/main" val="3044071758"/>
       </p:ext>
     </p:extLst>
   </p:cSld>
   <p:clrMapOvr>
     <a:masterClrMapping/>
   </p:clrMapOvr>
-  <p:timing>
-    <p:tnLst>
-      <p:par>
-        <p:cTn id="1" dur="indefinite" restart="never" nodeType="tmRoot"/>
-      </p:par>
-    </p:tnLst>
-  </p:timing>
 </p:sld>
 </file>
 
@@ -6870,23 +7169,7 @@
                   <a:schemeClr val="tx1"/>
                 </a:solidFill>
               </a:rPr>
-              <a:t>Approaches to reach </a:t>
-            </a:r>
-            <a:r>
-              <a:rPr lang="en-US" sz="2800" b="1" dirty="0" smtClean="0">
-                <a:solidFill>
-                  <a:schemeClr val="tx1"/>
-                </a:solidFill>
-              </a:rPr>
-              <a:t>goals / Hacking </a:t>
-            </a:r>
-            <a:r>
-              <a:rPr lang="en-US" sz="2800" b="1" dirty="0" err="1" smtClean="0">
-                <a:solidFill>
-                  <a:schemeClr val="tx1"/>
-                </a:solidFill>
-              </a:rPr>
-              <a:t>organisation</a:t>
+              <a:t>Expected Outcomes</a:t>
             </a:r>
             <a:endParaRPr lang="fr-FR" sz="2800" b="1" dirty="0">
               <a:solidFill>
@@ -6938,7 +7221,7 @@
           </a:lstStyle>
           <a:p>
             <a:r>
-              <a:rPr lang="fr-FR" sz="2000" b="1" smtClean="0">
+              <a:rPr lang="fr-FR" sz="2000" b="1">
                 <a:solidFill>
                   <a:schemeClr val="tx1"/>
                 </a:solidFill>
@@ -7034,14 +7317,14 @@
       </p:pic>
       <p:sp>
         <p:nvSpPr>
-          <p:cNvPr id="23" name="ZoneTexte 22"/>
+          <p:cNvPr id="3" name="ZoneTexte 2"/>
           <p:cNvSpPr txBox="1"/>
           <p:nvPr/>
         </p:nvSpPr>
         <p:spPr>
           <a:xfrm>
             <a:off x="939337" y="1737360"/>
-            <a:ext cx="10507288" cy="7109639"/>
+            <a:ext cx="10507288" cy="5262979"/>
           </a:xfrm>
           <a:prstGeom prst="rect">
             <a:avLst/>
@@ -7055,8 +7338,8 @@
           <a:lstStyle/>
           <a:p>
             <a:r>
-              <a:rPr lang="en-US" sz="2400" dirty="0" smtClean="0"/>
-              <a:t>Tasks can be done in parallel</a:t>
+              <a:rPr lang="en-US" sz="2400" dirty="0"/>
+              <a:t>We propose to try to:</a:t>
             </a:r>
           </a:p>
           <a:p>
@@ -7068,12 +7351,42 @@
               <a:buChar char="•"/>
             </a:pPr>
             <a:r>
-              <a:rPr lang="en-US" sz="2400" dirty="0" smtClean="0"/>
-              <a:t>Identify each relevant sources. Give a quick definition. List existing or craft sample query for RD perspective.</a:t>
-            </a:r>
-          </a:p>
-          <a:p>
-            <a:endParaRPr lang="en-US" sz="2400" dirty="0" smtClean="0"/>
+              <a:rPr lang="en-US" sz="2400" dirty="0"/>
+              <a:t>Obtain an (editable) catalogue of relevant </a:t>
+            </a:r>
+            <a:r>
+              <a:rPr lang="en-US" sz="2400" dirty="0" err="1"/>
+              <a:t>sparql</a:t>
+            </a:r>
+            <a:r>
+              <a:rPr lang="en-US" sz="2400" dirty="0"/>
+              <a:t> Endpoint in the field of RD.</a:t>
+            </a:r>
+          </a:p>
+          <a:p>
+            <a:pPr marL="1257300" lvl="2" indent="-342900">
+              <a:buFont typeface="Wingdings" panose="05000000000000000000" pitchFamily="2" charset="2"/>
+              <a:buChar char="Ø"/>
+            </a:pPr>
+            <a:r>
+              <a:rPr lang="en-US" sz="2400" dirty="0" err="1"/>
+              <a:t>Biotools</a:t>
+            </a:r>
+            <a:r>
+              <a:rPr lang="en-US" sz="2400" dirty="0"/>
+              <a:t> =&gt; “</a:t>
+            </a:r>
+            <a:r>
+              <a:rPr lang="en-US" sz="2400" dirty="0" err="1"/>
+              <a:t>sparql</a:t>
+            </a:r>
+            <a:r>
+              <a:rPr lang="en-US" sz="2400" dirty="0"/>
+              <a:t>”, “endpoint”, “rare diseases”</a:t>
+            </a:r>
+          </a:p>
+          <a:p>
+            <a:endParaRPr lang="en-US" sz="2400" dirty="0"/>
           </a:p>
           <a:p>
             <a:pPr marL="285750" indent="-285750">
@@ -7081,36 +7394,27 @@
               <a:buChar char="•"/>
             </a:pPr>
             <a:r>
-              <a:rPr lang="en-US" sz="2400" dirty="0" smtClean="0"/>
-              <a:t>Setup a web interface to manage resource information and queries (</a:t>
-            </a:r>
-            <a:r>
-              <a:rPr lang="en-US" sz="2400" dirty="0" err="1" smtClean="0"/>
-              <a:t>jupyter</a:t>
-            </a:r>
-            <a:r>
-              <a:rPr lang="en-US" sz="2400" dirty="0" smtClean="0"/>
-              <a:t> note book ? Lodestar ? </a:t>
-            </a:r>
-            <a:r>
-              <a:rPr lang="en-US" sz="2400" dirty="0" err="1" smtClean="0"/>
-              <a:t>YASGui</a:t>
-            </a:r>
-            <a:r>
-              <a:rPr lang="en-US" sz="2400" dirty="0" smtClean="0"/>
-              <a:t>…) : </a:t>
-            </a:r>
-            <a:r>
-              <a:rPr lang="en-US" sz="2400" u="sng" dirty="0" smtClean="0"/>
-              <a:t>your expertise is needed </a:t>
-            </a:r>
-            <a:r>
-              <a:rPr lang="en-US" sz="2400" dirty="0" smtClean="0"/>
-              <a:t>!</a:t>
-            </a:r>
-          </a:p>
-          <a:p>
-            <a:endParaRPr lang="en-US" sz="2400" dirty="0" smtClean="0"/>
+              <a:rPr lang="en-US" sz="2400" dirty="0"/>
+              <a:t>Provide (or list existing) </a:t>
+            </a:r>
+            <a:r>
+              <a:rPr lang="en-US" sz="2400" dirty="0" err="1"/>
+              <a:t>sparql</a:t>
+            </a:r>
+            <a:r>
+              <a:rPr lang="en-US" sz="2400" dirty="0"/>
+              <a:t> queries for each sources, relevant for RD</a:t>
+            </a:r>
+          </a:p>
+          <a:p>
+            <a:pPr marL="742950" lvl="1" indent="-285750">
+              <a:buFont typeface="Arial" panose="020B0604020202020204" pitchFamily="34" charset="0"/>
+              <a:buChar char="•"/>
+            </a:pPr>
+            <a:endParaRPr lang="en-US" sz="2400" dirty="0"/>
+          </a:p>
+          <a:p>
+            <a:endParaRPr lang="en-US" sz="2400" dirty="0"/>
           </a:p>
           <a:p>
             <a:pPr marL="285750" indent="-285750">
@@ -7118,110 +7422,17 @@
               <a:buChar char="•"/>
             </a:pPr>
             <a:r>
-              <a:rPr lang="en-US" sz="2400" dirty="0" smtClean="0"/>
-              <a:t>Play time : try to setup several federated queries around </a:t>
-            </a:r>
-            <a:r>
-              <a:rPr lang="en-US" sz="2400" dirty="0" err="1" smtClean="0"/>
+              <a:rPr lang="en-US" sz="2400" dirty="0"/>
+              <a:t>Give access to federated </a:t>
+            </a:r>
+            <a:r>
+              <a:rPr lang="en-US" sz="2400" dirty="0" err="1"/>
               <a:t>sparql</a:t>
             </a:r>
             <a:r>
-              <a:rPr lang="en-US" sz="2400" dirty="0" smtClean="0"/>
-              <a:t> </a:t>
-            </a:r>
-            <a:r>
-              <a:rPr lang="en-US" sz="2400" dirty="0" smtClean="0"/>
-              <a:t>endpoints</a:t>
-            </a:r>
-          </a:p>
-          <a:p>
-            <a:pPr marL="800100" lvl="1" indent="-342900">
-              <a:buFont typeface="Wingdings" panose="05000000000000000000" pitchFamily="2" charset="2"/>
-              <a:buChar char="Ø"/>
-            </a:pPr>
-            <a:r>
-              <a:rPr lang="en-US" sz="2400" dirty="0" smtClean="0"/>
-              <a:t>Provide a </a:t>
-            </a:r>
-            <a:r>
-              <a:rPr lang="en-US" sz="2400" dirty="0" err="1" smtClean="0"/>
-              <a:t>docker</a:t>
-            </a:r>
-            <a:r>
-              <a:rPr lang="en-US" sz="2400" dirty="0" smtClean="0"/>
-              <a:t> image of </a:t>
-            </a:r>
-            <a:r>
-              <a:rPr lang="en-US" sz="2400" dirty="0" err="1" smtClean="0"/>
-              <a:t>sparql</a:t>
-            </a:r>
-            <a:r>
-              <a:rPr lang="en-US" sz="2400" dirty="0" smtClean="0"/>
-              <a:t> </a:t>
-            </a:r>
-            <a:r>
-              <a:rPr lang="en-US" sz="2400" dirty="0" err="1" smtClean="0"/>
-              <a:t>enpoint</a:t>
-            </a:r>
-            <a:r>
-              <a:rPr lang="en-US" sz="2400" dirty="0" smtClean="0"/>
-              <a:t> already loaded.</a:t>
-            </a:r>
-            <a:br>
-              <a:rPr lang="en-US" sz="2400" dirty="0" smtClean="0"/>
-            </a:br>
-            <a:endParaRPr lang="en-US" sz="2400" dirty="0" smtClean="0"/>
-          </a:p>
-          <a:p>
-            <a:pPr algn="ctr"/>
-            <a:r>
               <a:rPr lang="en-US" sz="2400" dirty="0"/>
-              <a:t> </a:t>
-            </a:r>
-            <a:r>
-              <a:rPr lang="en-US" sz="2400" dirty="0" smtClean="0"/>
-              <a:t>    </a:t>
-            </a:r>
-            <a:r>
-              <a:rPr lang="en-US" sz="2400" b="1" u="sng" dirty="0" smtClean="0">
-                <a:solidFill>
-                  <a:srgbClr val="FF0000"/>
-                </a:solidFill>
-              </a:rPr>
-              <a:t>your </a:t>
-            </a:r>
-            <a:r>
-              <a:rPr lang="en-US" sz="2400" b="1" u="sng" dirty="0">
-                <a:solidFill>
-                  <a:srgbClr val="FF0000"/>
-                </a:solidFill>
-              </a:rPr>
-              <a:t>expertise is needed </a:t>
-            </a:r>
-            <a:r>
-              <a:rPr lang="en-US" sz="2400" b="1" dirty="0" smtClean="0">
-                <a:solidFill>
-                  <a:srgbClr val="FF0000"/>
-                </a:solidFill>
-              </a:rPr>
-              <a:t>!</a:t>
-            </a:r>
-          </a:p>
-          <a:p>
-            <a:endParaRPr lang="en-US" sz="2400" dirty="0"/>
-          </a:p>
-          <a:p>
-            <a:endParaRPr lang="en-US" sz="2400" dirty="0"/>
-          </a:p>
-          <a:p>
-            <a:pPr marL="285750" indent="-285750">
-              <a:buFont typeface="Arial" panose="020B0604020202020204" pitchFamily="34" charset="0"/>
-              <a:buChar char="•"/>
-            </a:pPr>
-            <a:endParaRPr lang="en-US" sz="2400" dirty="0" smtClean="0"/>
-          </a:p>
-          <a:p>
-            <a:endParaRPr lang="en-US" sz="2400" dirty="0" smtClean="0"/>
+              <a:t> queries across sources with example</a:t>
+            </a:r>
           </a:p>
           <a:p>
             <a:pPr marL="285750" indent="-285750">
@@ -7231,7 +7442,27 @@
             <a:endParaRPr lang="en-US" sz="2400" dirty="0"/>
           </a:p>
           <a:p>
-            <a:endParaRPr lang="fr-FR" sz="2400" dirty="0" smtClean="0"/>
+            <a:pPr marL="285750" indent="-285750">
+              <a:buFont typeface="Arial" panose="020B0604020202020204" pitchFamily="34" charset="0"/>
+              <a:buChar char="•"/>
+            </a:pPr>
+            <a:r>
+              <a:rPr lang="en-US" sz="2400" dirty="0"/>
+              <a:t>Provide nice web interface to end-users</a:t>
+            </a:r>
+          </a:p>
+          <a:p>
+            <a:pPr marL="285750" indent="-285750">
+              <a:buFont typeface="Arial" panose="020B0604020202020204" pitchFamily="34" charset="0"/>
+              <a:buChar char="•"/>
+            </a:pPr>
+            <a:r>
+              <a:rPr lang="en-US" sz="2400" dirty="0"/>
+              <a:t>Enjoy!</a:t>
+            </a:r>
+          </a:p>
+          <a:p>
+            <a:endParaRPr lang="fr-FR" sz="2400" dirty="0"/>
           </a:p>
           <a:p>
             <a:endParaRPr lang="fr-FR" sz="2400" dirty="0"/>
@@ -7241,20 +7472,13 @@
     </p:spTree>
     <p:extLst>
       <p:ext uri="{BB962C8B-B14F-4D97-AF65-F5344CB8AC3E}">
-        <p14:creationId xmlns:p14="http://schemas.microsoft.com/office/powerpoint/2010/main" val="3488683318"/>
+        <p14:creationId xmlns:p14="http://schemas.microsoft.com/office/powerpoint/2010/main" val="4255653707"/>
       </p:ext>
     </p:extLst>
   </p:cSld>
   <p:clrMapOvr>
     <a:masterClrMapping/>
   </p:clrMapOvr>
-  <p:timing>
-    <p:tnLst>
-      <p:par>
-        <p:cTn id="1" dur="indefinite" restart="never" nodeType="tmRoot"/>
-      </p:par>
-    </p:tnLst>
-  </p:timing>
 </p:sld>
 </file>
 
@@ -7291,12 +7515,20 @@
           <a:lstStyle/>
           <a:p>
             <a:r>
-              <a:rPr lang="fr-FR" sz="2800" b="1" smtClean="0">
+              <a:rPr lang="en-US" sz="2800" b="1" dirty="0">
                 <a:solidFill>
                   <a:schemeClr val="tx1"/>
                 </a:solidFill>
               </a:rPr>
-              <a:t>Skills Needed</a:t>
+              <a:t>Approaches to reach goals / Hacking </a:t>
+            </a:r>
+            <a:r>
+              <a:rPr lang="en-US" sz="2800" b="1" dirty="0" err="1">
+                <a:solidFill>
+                  <a:schemeClr val="tx1"/>
+                </a:solidFill>
+              </a:rPr>
+              <a:t>organisation</a:t>
             </a:r>
             <a:endParaRPr lang="fr-FR" sz="2800" b="1" dirty="0">
               <a:solidFill>
@@ -7348,7 +7580,7 @@
           </a:lstStyle>
           <a:p>
             <a:r>
-              <a:rPr lang="fr-FR" sz="2000" b="1" smtClean="0">
+              <a:rPr lang="fr-FR" sz="2000" b="1">
                 <a:solidFill>
                   <a:schemeClr val="tx1"/>
                 </a:solidFill>
@@ -7444,275 +7676,204 @@
       </p:pic>
       <p:sp>
         <p:nvSpPr>
-          <p:cNvPr id="24" name="Espace réservé du texte 6"/>
-          <p:cNvSpPr>
-            <a:spLocks noGrp="1"/>
-          </p:cNvSpPr>
-          <p:nvPr>
-            <p:ph type="body" sz="quarter" idx="13"/>
-          </p:nvPr>
+          <p:cNvPr id="23" name="ZoneTexte 22"/>
+          <p:cNvSpPr txBox="1"/>
+          <p:nvPr/>
         </p:nvSpPr>
         <p:spPr>
           <a:xfrm>
-            <a:off x="1065600" y="1915901"/>
-            <a:ext cx="10080000" cy="3210904"/>
-          </a:xfrm>
-        </p:spPr>
-        <p:txBody>
-          <a:bodyPr>
-            <a:normAutofit/>
+            <a:off x="939337" y="1737360"/>
+            <a:ext cx="10507288" cy="7109639"/>
+          </a:xfrm>
+          <a:prstGeom prst="rect">
+            <a:avLst/>
+          </a:prstGeom>
+          <a:noFill/>
+        </p:spPr>
+        <p:txBody>
+          <a:bodyPr wrap="square" rtlCol="0">
+            <a:spAutoFit/>
           </a:bodyPr>
           <a:lstStyle/>
           <a:p>
-            <a:pPr eaLnBrk="0" fontAlgn="base" hangingPunct="0">
-              <a:lnSpc>
-                <a:spcPct val="100000"/>
-              </a:lnSpc>
-              <a:spcBef>
-                <a:spcPct val="0"/>
-              </a:spcBef>
-              <a:spcAft>
-                <a:spcPct val="0"/>
-              </a:spcAft>
+            <a:r>
+              <a:rPr lang="en-US" sz="2400" dirty="0"/>
+              <a:t>Tasks can be done in parallel</a:t>
+            </a:r>
+          </a:p>
+          <a:p>
+            <a:endParaRPr lang="fr-FR" sz="2400" dirty="0"/>
+          </a:p>
+          <a:p>
+            <a:pPr marL="285750" indent="-285750">
+              <a:buFont typeface="Arial" panose="020B0604020202020204" pitchFamily="34" charset="0"/>
+              <a:buChar char="•"/>
             </a:pPr>
             <a:r>
-              <a:rPr lang="fr-FR" altLang="fr-FR" dirty="0" smtClean="0">
+              <a:rPr lang="en-US" sz="2400" dirty="0"/>
+              <a:t>Identify each relevant sources. Give a quick definition. List existing or craft sample query for RD perspective.</a:t>
+            </a:r>
+          </a:p>
+          <a:p>
+            <a:endParaRPr lang="en-US" sz="2400" dirty="0"/>
+          </a:p>
+          <a:p>
+            <a:pPr marL="285750" indent="-285750">
+              <a:buFont typeface="Arial" panose="020B0604020202020204" pitchFamily="34" charset="0"/>
+              <a:buChar char="•"/>
+            </a:pPr>
+            <a:r>
+              <a:rPr lang="en-US" sz="2400" dirty="0"/>
+              <a:t>Setup a web interface to manage resource information and queries (</a:t>
+            </a:r>
+            <a:r>
+              <a:rPr lang="en-US" sz="2400" dirty="0" err="1"/>
+              <a:t>jupyter</a:t>
+            </a:r>
+            <a:r>
+              <a:rPr lang="en-US" sz="2400" dirty="0"/>
+              <a:t> note book ? Lodestar ? </a:t>
+            </a:r>
+            <a:r>
+              <a:rPr lang="en-US" sz="2400" dirty="0" err="1"/>
+              <a:t>YASGui</a:t>
+            </a:r>
+            <a:r>
+              <a:rPr lang="en-US" sz="2400" dirty="0"/>
+              <a:t>…) : </a:t>
+            </a:r>
+            <a:r>
+              <a:rPr lang="en-US" sz="2400" u="sng" dirty="0"/>
+              <a:t>your expertise is needed </a:t>
+            </a:r>
+            <a:r>
+              <a:rPr lang="en-US" sz="2400" dirty="0"/>
+              <a:t>!</a:t>
+            </a:r>
+          </a:p>
+          <a:p>
+            <a:endParaRPr lang="en-US" sz="2400" dirty="0"/>
+          </a:p>
+          <a:p>
+            <a:pPr marL="285750" indent="-285750">
+              <a:buFont typeface="Arial" panose="020B0604020202020204" pitchFamily="34" charset="0"/>
+              <a:buChar char="•"/>
+            </a:pPr>
+            <a:r>
+              <a:rPr lang="en-US" sz="2400" dirty="0"/>
+              <a:t>Play time : try to setup several federated queries around </a:t>
+            </a:r>
+            <a:r>
+              <a:rPr lang="en-US" sz="2400" dirty="0" err="1"/>
+              <a:t>sparql</a:t>
+            </a:r>
+            <a:r>
+              <a:rPr lang="en-US" sz="2400" dirty="0"/>
+              <a:t> endpoints</a:t>
+            </a:r>
+          </a:p>
+          <a:p>
+            <a:pPr marL="800100" lvl="1" indent="-342900">
+              <a:buFont typeface="Wingdings" panose="05000000000000000000" pitchFamily="2" charset="2"/>
+              <a:buChar char="Ø"/>
+            </a:pPr>
+            <a:r>
+              <a:rPr lang="en-US" sz="2400" dirty="0"/>
+              <a:t>Provide a </a:t>
+            </a:r>
+            <a:r>
+              <a:rPr lang="en-US" sz="2400" dirty="0" err="1"/>
+              <a:t>docker</a:t>
+            </a:r>
+            <a:r>
+              <a:rPr lang="en-US" sz="2400" dirty="0"/>
+              <a:t> image of </a:t>
+            </a:r>
+            <a:r>
+              <a:rPr lang="en-US" sz="2400" dirty="0" err="1"/>
+              <a:t>sparql</a:t>
+            </a:r>
+            <a:r>
+              <a:rPr lang="en-US" sz="2400" dirty="0"/>
+              <a:t> </a:t>
+            </a:r>
+            <a:r>
+              <a:rPr lang="en-US" sz="2400" dirty="0" err="1"/>
+              <a:t>enpoint</a:t>
+            </a:r>
+            <a:r>
+              <a:rPr lang="en-US" sz="2400" dirty="0"/>
+              <a:t> already loaded.</a:t>
+            </a:r>
+            <a:br>
+              <a:rPr lang="en-US" sz="2400" dirty="0"/>
+            </a:br>
+            <a:endParaRPr lang="en-US" sz="2400" dirty="0"/>
+          </a:p>
+          <a:p>
+            <a:pPr algn="ctr"/>
+            <a:r>
+              <a:rPr lang="en-US" sz="2400" dirty="0"/>
+              <a:t>     </a:t>
+            </a:r>
+            <a:r>
+              <a:rPr lang="en-US" sz="2400" b="1" u="sng" dirty="0">
                 <a:solidFill>
-                  <a:srgbClr val="24292E"/>
+                  <a:srgbClr val="FF0000"/>
                 </a:solidFill>
-                <a:latin typeface="-apple-system"/>
               </a:rPr>
-              <a:t>SPARQL masters, </a:t>
-            </a:r>
-            <a:r>
-              <a:rPr lang="fr-FR" altLang="fr-FR" dirty="0" err="1" smtClean="0">
+              <a:t>your expertise is needed </a:t>
+            </a:r>
+            <a:r>
+              <a:rPr lang="en-US" sz="2400" b="1" dirty="0">
                 <a:solidFill>
-                  <a:srgbClr val="24292E"/>
+                  <a:srgbClr val="FF0000"/>
                 </a:solidFill>
-                <a:latin typeface="-apple-system"/>
               </a:rPr>
-              <a:t>ontologists</a:t>
-            </a:r>
-            <a:endParaRPr lang="fr-FR" altLang="fr-FR" dirty="0" smtClean="0">
-              <a:solidFill>
-                <a:srgbClr val="24292E"/>
-              </a:solidFill>
-              <a:latin typeface="-apple-system"/>
-            </a:endParaRPr>
-          </a:p>
-          <a:p>
-            <a:pPr eaLnBrk="0" fontAlgn="base" hangingPunct="0">
-              <a:lnSpc>
-                <a:spcPct val="100000"/>
-              </a:lnSpc>
-              <a:spcBef>
-                <a:spcPct val="0"/>
-              </a:spcBef>
-              <a:spcAft>
-                <a:spcPct val="0"/>
-              </a:spcAft>
+              <a:t>!</a:t>
+            </a:r>
+          </a:p>
+          <a:p>
+            <a:endParaRPr lang="en-US" sz="2400" dirty="0"/>
+          </a:p>
+          <a:p>
+            <a:endParaRPr lang="en-US" sz="2400" dirty="0"/>
+          </a:p>
+          <a:p>
+            <a:pPr marL="285750" indent="-285750">
+              <a:buFont typeface="Arial" panose="020B0604020202020204" pitchFamily="34" charset="0"/>
+              <a:buChar char="•"/>
             </a:pPr>
-            <a:r>
-              <a:rPr lang="fr-FR" altLang="fr-FR" dirty="0" smtClean="0">
-                <a:solidFill>
-                  <a:srgbClr val="24292E"/>
-                </a:solidFill>
-                <a:latin typeface="-apple-system"/>
-              </a:rPr>
-              <a:t>Python</a:t>
-            </a:r>
-            <a:r>
-              <a:rPr lang="fr-FR" altLang="fr-FR" dirty="0">
-                <a:solidFill>
-                  <a:srgbClr val="24292E"/>
-                </a:solidFill>
-                <a:latin typeface="-apple-system"/>
-              </a:rPr>
-              <a:t>, Web </a:t>
-            </a:r>
-            <a:r>
-              <a:rPr lang="fr-FR" altLang="fr-FR" dirty="0" smtClean="0">
-                <a:solidFill>
-                  <a:srgbClr val="24292E"/>
-                </a:solidFill>
-                <a:latin typeface="-apple-system"/>
-              </a:rPr>
-              <a:t>API, </a:t>
-            </a:r>
-            <a:r>
-              <a:rPr lang="fr-FR" altLang="fr-FR" dirty="0" smtClean="0">
-                <a:solidFill>
-                  <a:srgbClr val="24292E"/>
-                </a:solidFill>
-                <a:latin typeface="-apple-system"/>
-              </a:rPr>
-              <a:t>RDF</a:t>
-            </a:r>
-          </a:p>
-          <a:p>
-            <a:pPr eaLnBrk="0" fontAlgn="base" hangingPunct="0">
-              <a:lnSpc>
-                <a:spcPct val="100000"/>
-              </a:lnSpc>
-              <a:spcBef>
-                <a:spcPct val="0"/>
-              </a:spcBef>
-              <a:spcAft>
-                <a:spcPct val="0"/>
-              </a:spcAft>
+            <a:endParaRPr lang="en-US" sz="2400" dirty="0"/>
+          </a:p>
+          <a:p>
+            <a:endParaRPr lang="en-US" sz="2400" dirty="0"/>
+          </a:p>
+          <a:p>
+            <a:pPr marL="285750" indent="-285750">
+              <a:buFont typeface="Arial" panose="020B0604020202020204" pitchFamily="34" charset="0"/>
+              <a:buChar char="•"/>
             </a:pPr>
-            <a:r>
-              <a:rPr lang="fr-FR" altLang="fr-FR" dirty="0" smtClean="0">
-                <a:solidFill>
-                  <a:srgbClr val="24292E"/>
-                </a:solidFill>
-                <a:latin typeface="-apple-system"/>
-              </a:rPr>
-              <a:t>Docker</a:t>
-            </a:r>
-            <a:endParaRPr lang="fr-FR" altLang="fr-FR" dirty="0">
-              <a:solidFill>
-                <a:srgbClr val="24292E"/>
-              </a:solidFill>
-              <a:latin typeface="-apple-system"/>
-            </a:endParaRPr>
-          </a:p>
-          <a:p>
-            <a:pPr eaLnBrk="0" fontAlgn="base" hangingPunct="0">
-              <a:lnSpc>
-                <a:spcPct val="100000"/>
-              </a:lnSpc>
-              <a:spcBef>
-                <a:spcPct val="0"/>
-              </a:spcBef>
-              <a:spcAft>
-                <a:spcPct val="0"/>
-              </a:spcAft>
-            </a:pPr>
-            <a:endParaRPr lang="fr-FR" altLang="fr-FR" dirty="0" smtClean="0">
-              <a:solidFill>
-                <a:srgbClr val="24292E"/>
-              </a:solidFill>
-              <a:latin typeface="-apple-system"/>
-            </a:endParaRPr>
-          </a:p>
-          <a:p>
-            <a:pPr eaLnBrk="0" fontAlgn="base" hangingPunct="0">
-              <a:lnSpc>
-                <a:spcPct val="100000"/>
-              </a:lnSpc>
-              <a:spcBef>
-                <a:spcPct val="0"/>
-              </a:spcBef>
-              <a:spcAft>
-                <a:spcPct val="0"/>
-              </a:spcAft>
-            </a:pPr>
-            <a:endParaRPr lang="fr-FR" altLang="fr-FR" dirty="0">
-              <a:solidFill>
-                <a:srgbClr val="24292E"/>
-              </a:solidFill>
-              <a:latin typeface="-apple-system"/>
-            </a:endParaRPr>
-          </a:p>
-          <a:p>
-            <a:pPr eaLnBrk="0" fontAlgn="base" hangingPunct="0">
-              <a:lnSpc>
-                <a:spcPct val="100000"/>
-              </a:lnSpc>
-              <a:spcBef>
-                <a:spcPct val="0"/>
-              </a:spcBef>
-              <a:spcAft>
-                <a:spcPct val="0"/>
-              </a:spcAft>
-            </a:pPr>
-            <a:r>
-              <a:rPr lang="fr-FR" altLang="fr-FR" dirty="0" smtClean="0">
-                <a:solidFill>
-                  <a:srgbClr val="24292E"/>
-                </a:solidFill>
-                <a:latin typeface="-apple-system"/>
-              </a:rPr>
-              <a:t> </a:t>
-            </a:r>
-            <a:r>
-              <a:rPr lang="fr-FR" altLang="fr-FR" b="1" dirty="0" err="1" smtClean="0">
-                <a:solidFill>
-                  <a:srgbClr val="24292E"/>
-                </a:solidFill>
-                <a:latin typeface="-apple-system"/>
-              </a:rPr>
-              <a:t>Expected</a:t>
-            </a:r>
-            <a:r>
-              <a:rPr lang="fr-FR" altLang="fr-FR" b="1" dirty="0" smtClean="0">
-                <a:solidFill>
-                  <a:srgbClr val="24292E"/>
-                </a:solidFill>
-                <a:latin typeface="-apple-system"/>
-              </a:rPr>
-              <a:t> </a:t>
-            </a:r>
-            <a:r>
-              <a:rPr lang="fr-FR" altLang="fr-FR" b="1" dirty="0">
-                <a:solidFill>
-                  <a:srgbClr val="24292E"/>
-                </a:solidFill>
-                <a:latin typeface="-apple-system"/>
-              </a:rPr>
-              <a:t>hacking </a:t>
-            </a:r>
-            <a:r>
-              <a:rPr lang="fr-FR" altLang="fr-FR" b="1" dirty="0" err="1">
-                <a:solidFill>
-                  <a:srgbClr val="24292E"/>
-                </a:solidFill>
-                <a:latin typeface="-apple-system"/>
-              </a:rPr>
-              <a:t>days</a:t>
-            </a:r>
-            <a:r>
-              <a:rPr lang="fr-FR" altLang="fr-FR" dirty="0">
-                <a:solidFill>
-                  <a:srgbClr val="24292E"/>
-                </a:solidFill>
-                <a:latin typeface="-apple-system"/>
-              </a:rPr>
-              <a:t>: 4 </a:t>
-            </a:r>
-            <a:r>
-              <a:rPr lang="fr-FR" altLang="fr-FR" dirty="0" err="1">
-                <a:solidFill>
-                  <a:srgbClr val="24292E"/>
-                </a:solidFill>
-                <a:latin typeface="-apple-system"/>
-              </a:rPr>
-              <a:t>days</a:t>
-            </a:r>
-            <a:endParaRPr lang="fr-FR" altLang="fr-FR" sz="4000" dirty="0">
-              <a:latin typeface="Arial" panose="020B0604020202020204" pitchFamily="34" charset="0"/>
-            </a:endParaRPr>
+            <a:endParaRPr lang="en-US" sz="2400" dirty="0"/>
+          </a:p>
+          <a:p>
+            <a:endParaRPr lang="fr-FR" sz="2400" dirty="0"/>
+          </a:p>
+          <a:p>
+            <a:endParaRPr lang="fr-FR" sz="2400" dirty="0"/>
           </a:p>
         </p:txBody>
       </p:sp>
     </p:spTree>
     <p:extLst>
       <p:ext uri="{BB962C8B-B14F-4D97-AF65-F5344CB8AC3E}">
-        <p14:creationId xmlns:p14="http://schemas.microsoft.com/office/powerpoint/2010/main" val="3053611345"/>
+        <p14:creationId xmlns:p14="http://schemas.microsoft.com/office/powerpoint/2010/main" val="3488683318"/>
       </p:ext>
     </p:extLst>
   </p:cSld>
   <p:clrMapOvr>
     <a:masterClrMapping/>
   </p:clrMapOvr>
-  <p:timing>
-    <p:tnLst>
-      <p:par>
-        <p:cTn id="1" dur="indefinite" restart="never" nodeType="tmRoot"/>
-      </p:par>
-    </p:tnLst>
-  </p:timing>
 </p:sld>
 </file>
 
@@ -7745,25 +7906,501 @@
         </p:nvSpPr>
         <p:spPr/>
         <p:txBody>
+          <a:bodyPr/>
+          <a:lstStyle/>
+          <a:p>
+            <a:r>
+              <a:rPr lang="fr-FR" sz="2800" b="1">
+                <a:solidFill>
+                  <a:schemeClr val="tx1"/>
+                </a:solidFill>
+              </a:rPr>
+              <a:t>Skills Needed</a:t>
+            </a:r>
+            <a:endParaRPr lang="fr-FR" sz="2800" b="1" dirty="0">
+              <a:solidFill>
+                <a:schemeClr val="tx1"/>
+              </a:solidFill>
+            </a:endParaRPr>
+          </a:p>
+        </p:txBody>
+      </p:sp>
+      <p:sp>
+        <p:nvSpPr>
+          <p:cNvPr id="10" name="Titre 2"/>
+          <p:cNvSpPr txBox="1">
+            <a:spLocks/>
+          </p:cNvSpPr>
+          <p:nvPr/>
+        </p:nvSpPr>
+        <p:spPr>
+          <a:xfrm>
+            <a:off x="261546" y="6513141"/>
+            <a:ext cx="2897290" cy="314045"/>
+          </a:xfrm>
+          <a:prstGeom prst="rect">
+            <a:avLst/>
+          </a:prstGeom>
+        </p:spPr>
+        <p:txBody>
+          <a:bodyPr vert="horz" lIns="91440" tIns="45720" rIns="91440" bIns="45720" rtlCol="0" anchor="ctr">
+            <a:normAutofit fontScale="70000" lnSpcReduction="20000"/>
+          </a:bodyPr>
+          <a:lstStyle>
+            <a:lvl1pPr algn="l" defTabSz="914400" rtl="0" eaLnBrk="1" latinLnBrk="0" hangingPunct="1">
+              <a:lnSpc>
+                <a:spcPct val="90000"/>
+              </a:lnSpc>
+              <a:spcBef>
+                <a:spcPct val="0"/>
+              </a:spcBef>
+              <a:buNone/>
+              <a:defRPr sz="2667" kern="1200" baseline="0">
+                <a:solidFill>
+                  <a:schemeClr val="tx2"/>
+                </a:solidFill>
+                <a:latin typeface="+mj-lt"/>
+                <a:ea typeface="+mj-ea"/>
+                <a:cs typeface="+mj-cs"/>
+              </a:defRPr>
+            </a:lvl1pPr>
+          </a:lstStyle>
+          <a:p>
+            <a:r>
+              <a:rPr lang="fr-FR" sz="2000" b="1">
+                <a:solidFill>
+                  <a:schemeClr val="tx1"/>
+                </a:solidFill>
+              </a:rPr>
+              <a:t>BioHackathon Paris – 12/16 Nov 2018</a:t>
+            </a:r>
+            <a:endParaRPr lang="fr-FR" sz="2000" b="1" dirty="0">
+              <a:solidFill>
+                <a:schemeClr val="tx1"/>
+              </a:solidFill>
+            </a:endParaRPr>
+          </a:p>
+        </p:txBody>
+      </p:sp>
+      <p:pic>
+        <p:nvPicPr>
+          <p:cNvPr id="13" name="Image 12"/>
+          <p:cNvPicPr>
+            <a:picLocks noChangeAspect="1"/>
+          </p:cNvPicPr>
+          <p:nvPr/>
+        </p:nvPicPr>
+        <p:blipFill>
+          <a:blip r:embed="rId3" cstate="print">
+            <a:clrChange>
+              <a:clrFrom>
+                <a:srgbClr val="FFFFFF"/>
+              </a:clrFrom>
+              <a:clrTo>
+                <a:srgbClr val="FFFFFF">
+                  <a:alpha val="0"/>
+                </a:srgbClr>
+              </a:clrTo>
+            </a:clrChange>
+            <a:extLst>
+              <a:ext uri="{28A0092B-C50C-407E-A947-70E740481C1C}">
+                <a14:useLocalDpi xmlns:a14="http://schemas.microsoft.com/office/drawing/2010/main" val="0"/>
+              </a:ext>
+            </a:extLst>
+          </a:blip>
+          <a:stretch>
+            <a:fillRect/>
+          </a:stretch>
+        </p:blipFill>
+        <p:spPr>
+          <a:xfrm>
+            <a:off x="3009207" y="6476326"/>
+            <a:ext cx="565266" cy="381674"/>
+          </a:xfrm>
+          <a:prstGeom prst="rect">
+            <a:avLst/>
+          </a:prstGeom>
+        </p:spPr>
+      </p:pic>
+      <p:pic>
+        <p:nvPicPr>
+          <p:cNvPr id="14" name="Image 13"/>
+          <p:cNvPicPr>
+            <a:picLocks noChangeAspect="1"/>
+          </p:cNvPicPr>
+          <p:nvPr/>
+        </p:nvPicPr>
+        <p:blipFill rotWithShape="1">
+          <a:blip r:embed="rId4">
+            <a:clrChange>
+              <a:clrFrom>
+                <a:srgbClr val="FFFFFF"/>
+              </a:clrFrom>
+              <a:clrTo>
+                <a:srgbClr val="FFFFFF">
+                  <a:alpha val="0"/>
+                </a:srgbClr>
+              </a:clrTo>
+            </a:clrChange>
+            <a:extLst>
+              <a:ext uri="{28A0092B-C50C-407E-A947-70E740481C1C}">
+                <a14:useLocalDpi xmlns:a14="http://schemas.microsoft.com/office/drawing/2010/main" val="0"/>
+              </a:ext>
+            </a:extLst>
+          </a:blip>
+          <a:srcRect t="34729" b="32957"/>
+          <a:stretch/>
+        </p:blipFill>
+        <p:spPr>
+          <a:xfrm>
+            <a:off x="10369731" y="6459182"/>
+            <a:ext cx="1138844" cy="368004"/>
+          </a:xfrm>
+          <a:prstGeom prst="rect">
+            <a:avLst/>
+          </a:prstGeom>
+        </p:spPr>
+      </p:pic>
+      <p:sp>
+        <p:nvSpPr>
+          <p:cNvPr id="24" name="Espace réservé du texte 6"/>
+          <p:cNvSpPr>
+            <a:spLocks noGrp="1"/>
+          </p:cNvSpPr>
+          <p:nvPr>
+            <p:ph type="body" sz="quarter" idx="13"/>
+          </p:nvPr>
+        </p:nvSpPr>
+        <p:spPr>
+          <a:xfrm>
+            <a:off x="1065600" y="1915901"/>
+            <a:ext cx="10080000" cy="3210904"/>
+          </a:xfrm>
+        </p:spPr>
+        <p:txBody>
+          <a:bodyPr>
+            <a:normAutofit/>
+          </a:bodyPr>
+          <a:lstStyle/>
+          <a:p>
+            <a:pPr eaLnBrk="0" fontAlgn="base" hangingPunct="0">
+              <a:lnSpc>
+                <a:spcPct val="100000"/>
+              </a:lnSpc>
+              <a:spcBef>
+                <a:spcPct val="0"/>
+              </a:spcBef>
+              <a:spcAft>
+                <a:spcPct val="0"/>
+              </a:spcAft>
+            </a:pPr>
+            <a:r>
+              <a:rPr lang="fr-FR" altLang="fr-FR" dirty="0">
+                <a:solidFill>
+                  <a:srgbClr val="24292E"/>
+                </a:solidFill>
+                <a:latin typeface="-apple-system"/>
+              </a:rPr>
+              <a:t>SPARQL masters, </a:t>
+            </a:r>
+            <a:r>
+              <a:rPr lang="fr-FR" altLang="fr-FR" dirty="0" err="1">
+                <a:solidFill>
+                  <a:srgbClr val="24292E"/>
+                </a:solidFill>
+                <a:latin typeface="-apple-system"/>
+              </a:rPr>
+              <a:t>ontologists</a:t>
+            </a:r>
+            <a:endParaRPr lang="fr-FR" altLang="fr-FR" dirty="0">
+              <a:solidFill>
+                <a:srgbClr val="24292E"/>
+              </a:solidFill>
+              <a:latin typeface="-apple-system"/>
+            </a:endParaRPr>
+          </a:p>
+          <a:p>
+            <a:pPr eaLnBrk="0" fontAlgn="base" hangingPunct="0">
+              <a:lnSpc>
+                <a:spcPct val="100000"/>
+              </a:lnSpc>
+              <a:spcBef>
+                <a:spcPct val="0"/>
+              </a:spcBef>
+              <a:spcAft>
+                <a:spcPct val="0"/>
+              </a:spcAft>
+            </a:pPr>
+            <a:r>
+              <a:rPr lang="fr-FR" altLang="fr-FR" dirty="0">
+                <a:solidFill>
+                  <a:srgbClr val="24292E"/>
+                </a:solidFill>
+                <a:latin typeface="-apple-system"/>
+              </a:rPr>
+              <a:t>Python, Web API, RDF</a:t>
+            </a:r>
+          </a:p>
+          <a:p>
+            <a:pPr eaLnBrk="0" fontAlgn="base" hangingPunct="0">
+              <a:lnSpc>
+                <a:spcPct val="100000"/>
+              </a:lnSpc>
+              <a:spcBef>
+                <a:spcPct val="0"/>
+              </a:spcBef>
+              <a:spcAft>
+                <a:spcPct val="0"/>
+              </a:spcAft>
+            </a:pPr>
+            <a:r>
+              <a:rPr lang="fr-FR" altLang="fr-FR" dirty="0">
+                <a:solidFill>
+                  <a:srgbClr val="24292E"/>
+                </a:solidFill>
+                <a:latin typeface="-apple-system"/>
+              </a:rPr>
+              <a:t>Docker</a:t>
+            </a:r>
+          </a:p>
+          <a:p>
+            <a:pPr eaLnBrk="0" fontAlgn="base" hangingPunct="0">
+              <a:lnSpc>
+                <a:spcPct val="100000"/>
+              </a:lnSpc>
+              <a:spcBef>
+                <a:spcPct val="0"/>
+              </a:spcBef>
+              <a:spcAft>
+                <a:spcPct val="0"/>
+              </a:spcAft>
+            </a:pPr>
+            <a:endParaRPr lang="fr-FR" altLang="fr-FR" dirty="0">
+              <a:solidFill>
+                <a:srgbClr val="24292E"/>
+              </a:solidFill>
+              <a:latin typeface="-apple-system"/>
+            </a:endParaRPr>
+          </a:p>
+          <a:p>
+            <a:pPr eaLnBrk="0" fontAlgn="base" hangingPunct="0">
+              <a:lnSpc>
+                <a:spcPct val="100000"/>
+              </a:lnSpc>
+              <a:spcBef>
+                <a:spcPct val="0"/>
+              </a:spcBef>
+              <a:spcAft>
+                <a:spcPct val="0"/>
+              </a:spcAft>
+            </a:pPr>
+            <a:endParaRPr lang="fr-FR" altLang="fr-FR" dirty="0">
+              <a:solidFill>
+                <a:srgbClr val="24292E"/>
+              </a:solidFill>
+              <a:latin typeface="-apple-system"/>
+            </a:endParaRPr>
+          </a:p>
+          <a:p>
+            <a:pPr eaLnBrk="0" fontAlgn="base" hangingPunct="0">
+              <a:lnSpc>
+                <a:spcPct val="100000"/>
+              </a:lnSpc>
+              <a:spcBef>
+                <a:spcPct val="0"/>
+              </a:spcBef>
+              <a:spcAft>
+                <a:spcPct val="0"/>
+              </a:spcAft>
+            </a:pPr>
+            <a:r>
+              <a:rPr lang="fr-FR" altLang="fr-FR" dirty="0">
+                <a:solidFill>
+                  <a:srgbClr val="24292E"/>
+                </a:solidFill>
+                <a:latin typeface="-apple-system"/>
+              </a:rPr>
+              <a:t> </a:t>
+            </a:r>
+            <a:r>
+              <a:rPr lang="fr-FR" altLang="fr-FR" b="1" dirty="0" err="1">
+                <a:solidFill>
+                  <a:srgbClr val="24292E"/>
+                </a:solidFill>
+                <a:latin typeface="-apple-system"/>
+              </a:rPr>
+              <a:t>Expected</a:t>
+            </a:r>
+            <a:r>
+              <a:rPr lang="fr-FR" altLang="fr-FR" b="1" dirty="0">
+                <a:solidFill>
+                  <a:srgbClr val="24292E"/>
+                </a:solidFill>
+                <a:latin typeface="-apple-system"/>
+              </a:rPr>
+              <a:t> hacking </a:t>
+            </a:r>
+            <a:r>
+              <a:rPr lang="fr-FR" altLang="fr-FR" b="1" dirty="0" err="1">
+                <a:solidFill>
+                  <a:srgbClr val="24292E"/>
+                </a:solidFill>
+                <a:latin typeface="-apple-system"/>
+              </a:rPr>
+              <a:t>days</a:t>
+            </a:r>
+            <a:r>
+              <a:rPr lang="fr-FR" altLang="fr-FR" dirty="0">
+                <a:solidFill>
+                  <a:srgbClr val="24292E"/>
+                </a:solidFill>
+                <a:latin typeface="-apple-system"/>
+              </a:rPr>
+              <a:t>: 4 </a:t>
+            </a:r>
+            <a:r>
+              <a:rPr lang="fr-FR" altLang="fr-FR" dirty="0" err="1">
+                <a:solidFill>
+                  <a:srgbClr val="24292E"/>
+                </a:solidFill>
+                <a:latin typeface="-apple-system"/>
+              </a:rPr>
+              <a:t>days</a:t>
+            </a:r>
+            <a:endParaRPr lang="fr-FR" altLang="fr-FR" sz="4000" dirty="0">
+              <a:latin typeface="Arial" panose="020B0604020202020204" pitchFamily="34" charset="0"/>
+            </a:endParaRPr>
+          </a:p>
+        </p:txBody>
+      </p:sp>
+      <p:pic>
+        <p:nvPicPr>
+          <p:cNvPr id="4" name="Image 3">
+            <a:extLst>
+              <a:ext uri="{FF2B5EF4-FFF2-40B4-BE49-F238E27FC236}">
+                <a16:creationId xmlns:a16="http://schemas.microsoft.com/office/drawing/2014/main" id="{28C83878-5028-4144-8828-CE4458713D49}"/>
+              </a:ext>
+            </a:extLst>
+          </p:cNvPr>
+          <p:cNvPicPr>
+            <a:picLocks noChangeAspect="1"/>
+          </p:cNvPicPr>
+          <p:nvPr/>
+        </p:nvPicPr>
+        <p:blipFill>
+          <a:blip r:embed="rId5" cstate="print">
+            <a:extLst>
+              <a:ext uri="{28A0092B-C50C-407E-A947-70E740481C1C}">
+                <a14:useLocalDpi xmlns:a14="http://schemas.microsoft.com/office/drawing/2010/main" val="0"/>
+              </a:ext>
+            </a:extLst>
+          </a:blip>
+          <a:stretch>
+            <a:fillRect/>
+          </a:stretch>
+        </p:blipFill>
+        <p:spPr>
+          <a:xfrm>
+            <a:off x="6238716" y="2144638"/>
+            <a:ext cx="5550611" cy="2753430"/>
+          </a:xfrm>
+          <a:prstGeom prst="rect">
+            <a:avLst/>
+          </a:prstGeom>
+        </p:spPr>
+      </p:pic>
+      <p:sp>
+        <p:nvSpPr>
+          <p:cNvPr id="5" name="ZoneTexte 4">
+            <a:extLst>
+              <a:ext uri="{FF2B5EF4-FFF2-40B4-BE49-F238E27FC236}">
+                <a16:creationId xmlns:a16="http://schemas.microsoft.com/office/drawing/2014/main" id="{E08A29D6-AFA4-4874-A5EC-946B390BD5D5}"/>
+              </a:ext>
+            </a:extLst>
+          </p:cNvPr>
+          <p:cNvSpPr txBox="1"/>
+          <p:nvPr/>
+        </p:nvSpPr>
+        <p:spPr>
+          <a:xfrm>
+            <a:off x="6174298" y="1775306"/>
+            <a:ext cx="3625416" cy="369332"/>
+          </a:xfrm>
+          <a:prstGeom prst="rect">
+            <a:avLst/>
+          </a:prstGeom>
+          <a:noFill/>
+        </p:spPr>
+        <p:txBody>
+          <a:bodyPr wrap="none" rtlCol="0">
+            <a:spAutoFit/>
+          </a:bodyPr>
+          <a:lstStyle/>
+          <a:p>
+            <a:r>
+              <a:rPr lang="fr-FR" dirty="0"/>
+              <a:t>http://scrumblr.ca/bh2018-orphanet</a:t>
+            </a:r>
+          </a:p>
+        </p:txBody>
+      </p:sp>
+    </p:spTree>
+    <p:extLst>
+      <p:ext uri="{BB962C8B-B14F-4D97-AF65-F5344CB8AC3E}">
+        <p14:creationId xmlns:p14="http://schemas.microsoft.com/office/powerpoint/2010/main" val="3053611345"/>
+      </p:ext>
+    </p:extLst>
+  </p:cSld>
+  <p:clrMapOvr>
+    <a:masterClrMapping/>
+  </p:clrMapOvr>
+</p:sld>
+</file>
+
+<file path=ppt/slides/slide9.xml><?xml version="1.0" encoding="utf-8"?>
+<p:sld xmlns:a="http://schemas.openxmlformats.org/drawingml/2006/main" xmlns:r="http://schemas.openxmlformats.org/officeDocument/2006/relationships" xmlns:p="http://schemas.openxmlformats.org/presentationml/2006/main">
+  <p:cSld>
+    <p:spTree>
+      <p:nvGrpSpPr>
+        <p:cNvPr id="1" name=""/>
+        <p:cNvGrpSpPr/>
+        <p:nvPr/>
+      </p:nvGrpSpPr>
+      <p:grpSpPr>
+        <a:xfrm>
+          <a:off x="0" y="0"/>
+          <a:ext cx="0" cy="0"/>
+          <a:chOff x="0" y="0"/>
+          <a:chExt cx="0" cy="0"/>
+        </a:xfrm>
+      </p:grpSpPr>
+      <p:sp>
+        <p:nvSpPr>
+          <p:cNvPr id="2" name="Titre 1"/>
+          <p:cNvSpPr>
+            <a:spLocks noGrp="1"/>
+          </p:cNvSpPr>
+          <p:nvPr>
+            <p:ph type="title"/>
+          </p:nvPr>
+        </p:nvSpPr>
+        <p:spPr/>
+        <p:txBody>
           <a:bodyPr>
             <a:normAutofit fontScale="90000"/>
           </a:bodyPr>
           <a:lstStyle/>
           <a:p>
             <a:r>
-              <a:rPr lang="fr-FR" sz="3100" b="1" smtClean="0">
+              <a:rPr lang="fr-FR" sz="3100" b="1">
                 <a:solidFill>
                   <a:schemeClr val="tx1"/>
                 </a:solidFill>
               </a:rPr>
               <a:t>LINKS</a:t>
             </a:r>
-            <a:r>
-              <a:rPr lang="fr-FR" smtClean="0"/>
-              <a:t/>
-            </a:r>
             <a:br>
-              <a:rPr lang="fr-FR" smtClean="0"/>
+              <a:rPr lang="fr-FR"/>
             </a:br>
             <a:endParaRPr lang="fr-FR"/>
           </a:p>
@@ -7800,26 +8437,25 @@
           <a:p>
             <a:pPr lvl="1" fontAlgn="base"/>
             <a:r>
-              <a:rPr lang="en-US" dirty="0" smtClean="0"/>
+              <a:rPr lang="en-US" dirty="0"/>
               <a:t>Marc </a:t>
             </a:r>
             <a:r>
-              <a:rPr lang="en-US" dirty="0" err="1" smtClean="0"/>
+              <a:rPr lang="en-US" dirty="0" err="1"/>
               <a:t>Hanauer</a:t>
             </a:r>
             <a:r>
-              <a:rPr lang="en-US" dirty="0" smtClean="0"/>
+              <a:rPr lang="en-US" dirty="0"/>
               <a:t>, </a:t>
             </a:r>
             <a:r>
-              <a:rPr lang="en-US" dirty="0" err="1" smtClean="0"/>
+              <a:rPr lang="en-US" dirty="0" err="1"/>
               <a:t>Orphanet</a:t>
             </a:r>
             <a:r>
-              <a:rPr lang="en-US" dirty="0" smtClean="0"/>
+              <a:rPr lang="en-US" dirty="0"/>
               <a:t> INSERM</a:t>
             </a:r>
-            <a:endParaRPr lang="en-US" dirty="0"/>
           </a:p>
           <a:p>
             <a:pPr fontAlgn="base"/>
@@ -7831,31 +8467,31 @@
           <a:p>
             <a:pPr lvl="1" fontAlgn="base"/>
             <a:r>
-              <a:rPr lang="en-US" dirty="0" err="1" smtClean="0"/>
+              <a:rPr lang="en-US" dirty="0" err="1"/>
               <a:t>Andra</a:t>
             </a:r>
             <a:r>
-              <a:rPr lang="en-US" u="sng" dirty="0" smtClean="0"/>
+              <a:rPr lang="en-US" u="sng" dirty="0"/>
               <a:t> </a:t>
             </a:r>
             <a:r>
-              <a:rPr lang="en-US" dirty="0" err="1" smtClean="0"/>
+              <a:rPr lang="en-US" dirty="0" err="1"/>
               <a:t>Waagmeester</a:t>
             </a:r>
             <a:r>
-              <a:rPr lang="en-US" dirty="0" smtClean="0"/>
+              <a:rPr lang="en-US" dirty="0"/>
               <a:t>, </a:t>
             </a:r>
             <a:r>
-              <a:rPr lang="en-US" dirty="0" err="1" smtClean="0"/>
+              <a:rPr lang="en-US" dirty="0" err="1"/>
               <a:t>Micelio</a:t>
             </a:r>
-            <a:endParaRPr lang="en-US" dirty="0" smtClean="0"/>
+            <a:endParaRPr lang="en-US" dirty="0"/>
           </a:p>
           <a:p>
             <a:pPr lvl="1" fontAlgn="base"/>
             <a:r>
-              <a:rPr lang="en-US" dirty="0" smtClean="0">
+              <a:rPr lang="en-US" dirty="0">
                 <a:solidFill>
                   <a:srgbClr val="FF0000"/>
                 </a:solidFill>
@@ -7878,11 +8514,11 @@
               <a:buNone/>
             </a:pPr>
             <a:r>
-              <a:rPr lang="fr-FR" dirty="0" err="1" smtClean="0"/>
+              <a:rPr lang="fr-FR" dirty="0" err="1"/>
               <a:t>Biohackathon</a:t>
             </a:r>
             <a:r>
-              <a:rPr lang="fr-FR" dirty="0" smtClean="0"/>
+              <a:rPr lang="fr-FR" dirty="0"/>
               <a:t> </a:t>
             </a:r>
             <a:r>
@@ -7894,9 +8530,17 @@
               <a:t>: </a:t>
             </a:r>
             <a:r>
-              <a:rPr lang="fr-FR" u="sng" dirty="0"/>
+              <a:rPr lang="fr-FR" u="sng" dirty="0">
+                <a:hlinkClick r:id="rId2"/>
+              </a:rPr>
               <a:t>https://bit.ly/2P406Jd</a:t>
             </a:r>
+            <a:endParaRPr lang="fr-FR" u="sng" dirty="0"/>
+          </a:p>
+          <a:p>
+            <a:pPr marL="0" indent="0" fontAlgn="base">
+              <a:buNone/>
+            </a:pPr>
             <a:endParaRPr lang="en-US" dirty="0"/>
           </a:p>
           <a:p>

</xml_diff>